<commit_message>
Updated slideshow and testing policy
</commit_message>
<xml_diff>
--- a/Documentation/Demo 4 documents/Demo 4 Slideshow.pptx
+++ b/Documentation/Demo 4 documents/Demo 4 Slideshow.pptx
@@ -13,10 +13,12 @@
     <p:sldId id="317" r:id="rId7"/>
     <p:sldId id="324" r:id="rId8"/>
     <p:sldId id="325" r:id="rId9"/>
-    <p:sldId id="328" r:id="rId10"/>
-    <p:sldId id="323" r:id="rId11"/>
-    <p:sldId id="300" r:id="rId12"/>
-    <p:sldId id="305" r:id="rId13"/>
+    <p:sldId id="329" r:id="rId10"/>
+    <p:sldId id="330" r:id="rId11"/>
+    <p:sldId id="328" r:id="rId12"/>
+    <p:sldId id="323" r:id="rId13"/>
+    <p:sldId id="300" r:id="rId14"/>
+    <p:sldId id="305" r:id="rId15"/>
   </p:sldIdLst>
   <p:sldSz cx="12192000" cy="6858000"/>
   <p:notesSz cx="6858000" cy="9144000"/>
@@ -4605,6 +4607,3205 @@
       </p:grpSpPr>
       <p:sp>
         <p:nvSpPr>
+          <p:cNvPr id="6" name="Oval 5">
+            <a:extLst>
+              <a:ext uri="{FF2B5EF4-FFF2-40B4-BE49-F238E27FC236}">
+                <a16:creationId xmlns:a16="http://schemas.microsoft.com/office/drawing/2014/main" id="{0A4ABBFC-76A7-4FC2-A983-AB55DB1BF542}"/>
+              </a:ext>
+            </a:extLst>
+          </p:cNvPr>
+          <p:cNvSpPr/>
+          <p:nvPr/>
+        </p:nvSpPr>
+        <p:spPr>
+          <a:xfrm>
+            <a:off x="1032025" y="673184"/>
+            <a:ext cx="262560" cy="262560"/>
+          </a:xfrm>
+          <a:prstGeom prst="ellipse">
+            <a:avLst/>
+          </a:prstGeom>
+          <a:solidFill>
+            <a:schemeClr val="bg1"/>
+          </a:solidFill>
+          <a:ln>
+            <a:noFill/>
+          </a:ln>
+        </p:spPr>
+        <p:style>
+          <a:lnRef idx="2">
+            <a:schemeClr val="accent1">
+              <a:shade val="50000"/>
+            </a:schemeClr>
+          </a:lnRef>
+          <a:fillRef idx="1">
+            <a:schemeClr val="accent1"/>
+          </a:fillRef>
+          <a:effectRef idx="0">
+            <a:schemeClr val="accent1"/>
+          </a:effectRef>
+          <a:fontRef idx="minor">
+            <a:schemeClr val="lt1"/>
+          </a:fontRef>
+        </p:style>
+        <p:txBody>
+          <a:bodyPr rtlCol="0" anchor="ctr"/>
+          <a:lstStyle/>
+          <a:p>
+            <a:pPr marL="0" marR="0" lvl="0" indent="0" algn="ctr" defTabSz="914400" rtl="0" eaLnBrk="1" fontAlgn="auto" latinLnBrk="0" hangingPunct="1">
+              <a:lnSpc>
+                <a:spcPct val="100000"/>
+              </a:lnSpc>
+              <a:spcBef>
+                <a:spcPts val="0"/>
+              </a:spcBef>
+              <a:spcAft>
+                <a:spcPts val="0"/>
+              </a:spcAft>
+              <a:buClrTx/>
+              <a:buSzTx/>
+              <a:buFontTx/>
+              <a:buNone/>
+              <a:tabLst/>
+              <a:defRPr/>
+            </a:pPr>
+            <a:endParaRPr kumimoji="0" lang="en-US" sz="1800" b="0" i="0" u="none" strike="noStrike" kern="1200" cap="none" spc="0" normalizeH="0" baseline="0" noProof="0" dirty="0">
+              <a:ln>
+                <a:noFill/>
+              </a:ln>
+              <a:solidFill>
+                <a:prstClr val="white"/>
+              </a:solidFill>
+              <a:effectLst/>
+              <a:uLnTx/>
+              <a:uFillTx/>
+              <a:latin typeface="Montserrat"/>
+              <a:ea typeface="+mn-ea"/>
+              <a:cs typeface="+mn-cs"/>
+            </a:endParaRPr>
+          </a:p>
+        </p:txBody>
+      </p:sp>
+      <p:sp>
+        <p:nvSpPr>
+          <p:cNvPr id="8" name="Freeform: Shape 7">
+            <a:extLst>
+              <a:ext uri="{FF2B5EF4-FFF2-40B4-BE49-F238E27FC236}">
+                <a16:creationId xmlns:a16="http://schemas.microsoft.com/office/drawing/2014/main" id="{D05ED739-895E-49AA-BBA0-0E1AEE15D56F}"/>
+              </a:ext>
+            </a:extLst>
+          </p:cNvPr>
+          <p:cNvSpPr/>
+          <p:nvPr/>
+        </p:nvSpPr>
+        <p:spPr>
+          <a:xfrm rot="10800000">
+            <a:off x="-871" y="6204894"/>
+            <a:ext cx="131280" cy="262560"/>
+          </a:xfrm>
+          <a:custGeom>
+            <a:avLst/>
+            <a:gdLst>
+              <a:gd name="connsiteX0" fmla="*/ 131280 w 131280"/>
+              <a:gd name="connsiteY0" fmla="*/ 0 h 262560"/>
+              <a:gd name="connsiteX1" fmla="*/ 131280 w 131280"/>
+              <a:gd name="connsiteY1" fmla="*/ 262560 h 262560"/>
+              <a:gd name="connsiteX2" fmla="*/ 0 w 131280"/>
+              <a:gd name="connsiteY2" fmla="*/ 131280 h 262560"/>
+              <a:gd name="connsiteX3" fmla="*/ 131280 w 131280"/>
+              <a:gd name="connsiteY3" fmla="*/ 0 h 262560"/>
+            </a:gdLst>
+            <a:ahLst/>
+            <a:cxnLst>
+              <a:cxn ang="0">
+                <a:pos x="connsiteX0" y="connsiteY0"/>
+              </a:cxn>
+              <a:cxn ang="0">
+                <a:pos x="connsiteX1" y="connsiteY1"/>
+              </a:cxn>
+              <a:cxn ang="0">
+                <a:pos x="connsiteX2" y="connsiteY2"/>
+              </a:cxn>
+              <a:cxn ang="0">
+                <a:pos x="connsiteX3" y="connsiteY3"/>
+              </a:cxn>
+            </a:cxnLst>
+            <a:rect l="l" t="t" r="r" b="b"/>
+            <a:pathLst>
+              <a:path w="131280" h="262560">
+                <a:moveTo>
+                  <a:pt x="131280" y="0"/>
+                </a:moveTo>
+                <a:lnTo>
+                  <a:pt x="131280" y="262560"/>
+                </a:lnTo>
+                <a:cubicBezTo>
+                  <a:pt x="58776" y="262560"/>
+                  <a:pt x="0" y="203784"/>
+                  <a:pt x="0" y="131280"/>
+                </a:cubicBezTo>
+                <a:cubicBezTo>
+                  <a:pt x="0" y="58776"/>
+                  <a:pt x="58776" y="0"/>
+                  <a:pt x="131280" y="0"/>
+                </a:cubicBezTo>
+                <a:close/>
+              </a:path>
+            </a:pathLst>
+          </a:custGeom>
+          <a:solidFill>
+            <a:schemeClr val="bg1"/>
+          </a:solidFill>
+          <a:ln>
+            <a:noFill/>
+          </a:ln>
+        </p:spPr>
+        <p:style>
+          <a:lnRef idx="2">
+            <a:schemeClr val="accent1">
+              <a:shade val="50000"/>
+            </a:schemeClr>
+          </a:lnRef>
+          <a:fillRef idx="1">
+            <a:schemeClr val="accent1"/>
+          </a:fillRef>
+          <a:effectRef idx="0">
+            <a:schemeClr val="accent1"/>
+          </a:effectRef>
+          <a:fontRef idx="minor">
+            <a:schemeClr val="lt1"/>
+          </a:fontRef>
+        </p:style>
+        <p:txBody>
+          <a:bodyPr wrap="square" rtlCol="0" anchor="ctr">
+            <a:noAutofit/>
+          </a:bodyPr>
+          <a:lstStyle/>
+          <a:p>
+            <a:pPr marL="0" marR="0" lvl="0" indent="0" algn="ctr" defTabSz="914400" rtl="0" eaLnBrk="1" fontAlgn="auto" latinLnBrk="0" hangingPunct="1">
+              <a:lnSpc>
+                <a:spcPct val="100000"/>
+              </a:lnSpc>
+              <a:spcBef>
+                <a:spcPts val="0"/>
+              </a:spcBef>
+              <a:spcAft>
+                <a:spcPts val="0"/>
+              </a:spcAft>
+              <a:buClrTx/>
+              <a:buSzTx/>
+              <a:buFontTx/>
+              <a:buNone/>
+              <a:tabLst/>
+              <a:defRPr/>
+            </a:pPr>
+            <a:endParaRPr kumimoji="0" lang="en-US" sz="1800" b="0" i="0" u="none" strike="noStrike" kern="1200" cap="none" spc="0" normalizeH="0" baseline="0" noProof="0" dirty="0">
+              <a:ln>
+                <a:noFill/>
+              </a:ln>
+              <a:solidFill>
+                <a:prstClr val="white"/>
+              </a:solidFill>
+              <a:effectLst/>
+              <a:uLnTx/>
+              <a:uFillTx/>
+              <a:latin typeface="Montserrat"/>
+              <a:ea typeface="+mn-ea"/>
+              <a:cs typeface="+mn-cs"/>
+            </a:endParaRPr>
+          </a:p>
+        </p:txBody>
+      </p:sp>
+      <p:sp>
+        <p:nvSpPr>
+          <p:cNvPr id="9" name="Freeform: Shape 8">
+            <a:extLst>
+              <a:ext uri="{FF2B5EF4-FFF2-40B4-BE49-F238E27FC236}">
+                <a16:creationId xmlns:a16="http://schemas.microsoft.com/office/drawing/2014/main" id="{D5447901-BA28-476E-94BF-5425985FA436}"/>
+              </a:ext>
+            </a:extLst>
+          </p:cNvPr>
+          <p:cNvSpPr/>
+          <p:nvPr/>
+        </p:nvSpPr>
+        <p:spPr>
+          <a:xfrm rot="10800000">
+            <a:off x="-871" y="1863642"/>
+            <a:ext cx="131280" cy="262560"/>
+          </a:xfrm>
+          <a:custGeom>
+            <a:avLst/>
+            <a:gdLst>
+              <a:gd name="connsiteX0" fmla="*/ 131280 w 131280"/>
+              <a:gd name="connsiteY0" fmla="*/ 0 h 262560"/>
+              <a:gd name="connsiteX1" fmla="*/ 131280 w 131280"/>
+              <a:gd name="connsiteY1" fmla="*/ 262560 h 262560"/>
+              <a:gd name="connsiteX2" fmla="*/ 0 w 131280"/>
+              <a:gd name="connsiteY2" fmla="*/ 131280 h 262560"/>
+              <a:gd name="connsiteX3" fmla="*/ 131280 w 131280"/>
+              <a:gd name="connsiteY3" fmla="*/ 0 h 262560"/>
+            </a:gdLst>
+            <a:ahLst/>
+            <a:cxnLst>
+              <a:cxn ang="0">
+                <a:pos x="connsiteX0" y="connsiteY0"/>
+              </a:cxn>
+              <a:cxn ang="0">
+                <a:pos x="connsiteX1" y="connsiteY1"/>
+              </a:cxn>
+              <a:cxn ang="0">
+                <a:pos x="connsiteX2" y="connsiteY2"/>
+              </a:cxn>
+              <a:cxn ang="0">
+                <a:pos x="connsiteX3" y="connsiteY3"/>
+              </a:cxn>
+            </a:cxnLst>
+            <a:rect l="l" t="t" r="r" b="b"/>
+            <a:pathLst>
+              <a:path w="131280" h="262560">
+                <a:moveTo>
+                  <a:pt x="131280" y="0"/>
+                </a:moveTo>
+                <a:lnTo>
+                  <a:pt x="131280" y="262560"/>
+                </a:lnTo>
+                <a:cubicBezTo>
+                  <a:pt x="58776" y="262560"/>
+                  <a:pt x="0" y="203784"/>
+                  <a:pt x="0" y="131280"/>
+                </a:cubicBezTo>
+                <a:cubicBezTo>
+                  <a:pt x="0" y="58776"/>
+                  <a:pt x="58776" y="0"/>
+                  <a:pt x="131280" y="0"/>
+                </a:cubicBezTo>
+                <a:close/>
+              </a:path>
+            </a:pathLst>
+          </a:custGeom>
+          <a:solidFill>
+            <a:schemeClr val="bg2">
+              <a:lumMod val="25000"/>
+            </a:schemeClr>
+          </a:solidFill>
+          <a:ln>
+            <a:noFill/>
+          </a:ln>
+        </p:spPr>
+        <p:style>
+          <a:lnRef idx="2">
+            <a:schemeClr val="accent1">
+              <a:shade val="50000"/>
+            </a:schemeClr>
+          </a:lnRef>
+          <a:fillRef idx="1">
+            <a:schemeClr val="accent1"/>
+          </a:fillRef>
+          <a:effectRef idx="0">
+            <a:schemeClr val="accent1"/>
+          </a:effectRef>
+          <a:fontRef idx="minor">
+            <a:schemeClr val="lt1"/>
+          </a:fontRef>
+        </p:style>
+        <p:txBody>
+          <a:bodyPr wrap="square" rtlCol="0" anchor="ctr">
+            <a:noAutofit/>
+          </a:bodyPr>
+          <a:lstStyle/>
+          <a:p>
+            <a:pPr marL="0" marR="0" lvl="0" indent="0" algn="ctr" defTabSz="914400" rtl="0" eaLnBrk="1" fontAlgn="auto" latinLnBrk="0" hangingPunct="1">
+              <a:lnSpc>
+                <a:spcPct val="100000"/>
+              </a:lnSpc>
+              <a:spcBef>
+                <a:spcPts val="0"/>
+              </a:spcBef>
+              <a:spcAft>
+                <a:spcPts val="0"/>
+              </a:spcAft>
+              <a:buClrTx/>
+              <a:buSzTx/>
+              <a:buFontTx/>
+              <a:buNone/>
+              <a:tabLst/>
+              <a:defRPr/>
+            </a:pPr>
+            <a:endParaRPr kumimoji="0" lang="en-US" sz="1800" b="0" i="0" u="none" strike="noStrike" kern="1200" cap="none" spc="0" normalizeH="0" baseline="0" noProof="0" dirty="0">
+              <a:ln>
+                <a:noFill/>
+              </a:ln>
+              <a:solidFill>
+                <a:prstClr val="white"/>
+              </a:solidFill>
+              <a:effectLst/>
+              <a:uLnTx/>
+              <a:uFillTx/>
+              <a:latin typeface="Montserrat"/>
+              <a:ea typeface="+mn-ea"/>
+              <a:cs typeface="+mn-cs"/>
+            </a:endParaRPr>
+          </a:p>
+        </p:txBody>
+      </p:sp>
+      <p:sp>
+        <p:nvSpPr>
+          <p:cNvPr id="10" name="Oval 9">
+            <a:extLst>
+              <a:ext uri="{FF2B5EF4-FFF2-40B4-BE49-F238E27FC236}">
+                <a16:creationId xmlns:a16="http://schemas.microsoft.com/office/drawing/2014/main" id="{B9732762-70FC-44FD-8026-6FC1020853A9}"/>
+              </a:ext>
+            </a:extLst>
+          </p:cNvPr>
+          <p:cNvSpPr/>
+          <p:nvPr/>
+        </p:nvSpPr>
+        <p:spPr>
+          <a:xfrm>
+            <a:off x="10848472" y="3340062"/>
+            <a:ext cx="158168" cy="158168"/>
+          </a:xfrm>
+          <a:prstGeom prst="ellipse">
+            <a:avLst/>
+          </a:prstGeom>
+          <a:solidFill>
+            <a:schemeClr val="bg2">
+              <a:lumMod val="25000"/>
+            </a:schemeClr>
+          </a:solidFill>
+          <a:ln>
+            <a:noFill/>
+          </a:ln>
+        </p:spPr>
+        <p:style>
+          <a:lnRef idx="2">
+            <a:schemeClr val="accent1">
+              <a:shade val="50000"/>
+            </a:schemeClr>
+          </a:lnRef>
+          <a:fillRef idx="1">
+            <a:schemeClr val="accent1"/>
+          </a:fillRef>
+          <a:effectRef idx="0">
+            <a:schemeClr val="accent1"/>
+          </a:effectRef>
+          <a:fontRef idx="minor">
+            <a:schemeClr val="lt1"/>
+          </a:fontRef>
+        </p:style>
+        <p:txBody>
+          <a:bodyPr rtlCol="0" anchor="ctr"/>
+          <a:lstStyle/>
+          <a:p>
+            <a:pPr marL="0" marR="0" lvl="0" indent="0" algn="ctr" defTabSz="914400" rtl="0" eaLnBrk="1" fontAlgn="auto" latinLnBrk="0" hangingPunct="1">
+              <a:lnSpc>
+                <a:spcPct val="100000"/>
+              </a:lnSpc>
+              <a:spcBef>
+                <a:spcPts val="0"/>
+              </a:spcBef>
+              <a:spcAft>
+                <a:spcPts val="0"/>
+              </a:spcAft>
+              <a:buClrTx/>
+              <a:buSzTx/>
+              <a:buFontTx/>
+              <a:buNone/>
+              <a:tabLst/>
+              <a:defRPr/>
+            </a:pPr>
+            <a:endParaRPr kumimoji="0" lang="en-US" sz="1800" b="0" i="0" u="none" strike="noStrike" kern="1200" cap="none" spc="0" normalizeH="0" baseline="0" noProof="0" dirty="0">
+              <a:ln>
+                <a:noFill/>
+              </a:ln>
+              <a:solidFill>
+                <a:prstClr val="white"/>
+              </a:solidFill>
+              <a:effectLst/>
+              <a:uLnTx/>
+              <a:uFillTx/>
+              <a:latin typeface="Montserrat"/>
+              <a:ea typeface="+mn-ea"/>
+              <a:cs typeface="+mn-cs"/>
+            </a:endParaRPr>
+          </a:p>
+        </p:txBody>
+      </p:sp>
+      <p:sp>
+        <p:nvSpPr>
+          <p:cNvPr id="11" name="Oval 10">
+            <a:extLst>
+              <a:ext uri="{FF2B5EF4-FFF2-40B4-BE49-F238E27FC236}">
+                <a16:creationId xmlns:a16="http://schemas.microsoft.com/office/drawing/2014/main" id="{7EA21643-1E5D-4645-8448-B1E8F9598926}"/>
+              </a:ext>
+            </a:extLst>
+          </p:cNvPr>
+          <p:cNvSpPr/>
+          <p:nvPr/>
+        </p:nvSpPr>
+        <p:spPr>
+          <a:xfrm>
+            <a:off x="10949025" y="673184"/>
+            <a:ext cx="158168" cy="158168"/>
+          </a:xfrm>
+          <a:prstGeom prst="ellipse">
+            <a:avLst/>
+          </a:prstGeom>
+          <a:solidFill>
+            <a:schemeClr val="bg2">
+              <a:lumMod val="25000"/>
+            </a:schemeClr>
+          </a:solidFill>
+          <a:ln>
+            <a:noFill/>
+          </a:ln>
+        </p:spPr>
+        <p:style>
+          <a:lnRef idx="2">
+            <a:schemeClr val="accent1">
+              <a:shade val="50000"/>
+            </a:schemeClr>
+          </a:lnRef>
+          <a:fillRef idx="1">
+            <a:schemeClr val="accent1"/>
+          </a:fillRef>
+          <a:effectRef idx="0">
+            <a:schemeClr val="accent1"/>
+          </a:effectRef>
+          <a:fontRef idx="minor">
+            <a:schemeClr val="lt1"/>
+          </a:fontRef>
+        </p:style>
+        <p:txBody>
+          <a:bodyPr rtlCol="0" anchor="ctr"/>
+          <a:lstStyle/>
+          <a:p>
+            <a:pPr marL="0" marR="0" lvl="0" indent="0" algn="ctr" defTabSz="914400" rtl="0" eaLnBrk="1" fontAlgn="auto" latinLnBrk="0" hangingPunct="1">
+              <a:lnSpc>
+                <a:spcPct val="100000"/>
+              </a:lnSpc>
+              <a:spcBef>
+                <a:spcPts val="0"/>
+              </a:spcBef>
+              <a:spcAft>
+                <a:spcPts val="0"/>
+              </a:spcAft>
+              <a:buClrTx/>
+              <a:buSzTx/>
+              <a:buFontTx/>
+              <a:buNone/>
+              <a:tabLst/>
+              <a:defRPr/>
+            </a:pPr>
+            <a:endParaRPr kumimoji="0" lang="en-US" sz="1800" b="0" i="0" u="none" strike="noStrike" kern="1200" cap="none" spc="0" normalizeH="0" baseline="0" noProof="0" dirty="0">
+              <a:ln>
+                <a:noFill/>
+              </a:ln>
+              <a:solidFill>
+                <a:prstClr val="white"/>
+              </a:solidFill>
+              <a:effectLst/>
+              <a:uLnTx/>
+              <a:uFillTx/>
+              <a:latin typeface="Montserrat"/>
+              <a:ea typeface="+mn-ea"/>
+              <a:cs typeface="+mn-cs"/>
+            </a:endParaRPr>
+          </a:p>
+        </p:txBody>
+      </p:sp>
+      <p:sp>
+        <p:nvSpPr>
+          <p:cNvPr id="12" name="Oval 11">
+            <a:extLst>
+              <a:ext uri="{FF2B5EF4-FFF2-40B4-BE49-F238E27FC236}">
+                <a16:creationId xmlns:a16="http://schemas.microsoft.com/office/drawing/2014/main" id="{6F762BF8-9D33-4F22-8C8B-794D95486038}"/>
+              </a:ext>
+            </a:extLst>
+          </p:cNvPr>
+          <p:cNvSpPr/>
+          <p:nvPr/>
+        </p:nvSpPr>
+        <p:spPr>
+          <a:xfrm>
+            <a:off x="11206956" y="5933756"/>
+            <a:ext cx="262560" cy="262560"/>
+          </a:xfrm>
+          <a:prstGeom prst="ellipse">
+            <a:avLst/>
+          </a:prstGeom>
+          <a:solidFill>
+            <a:schemeClr val="bg1"/>
+          </a:solidFill>
+          <a:ln>
+            <a:noFill/>
+          </a:ln>
+        </p:spPr>
+        <p:style>
+          <a:lnRef idx="2">
+            <a:schemeClr val="accent1">
+              <a:shade val="50000"/>
+            </a:schemeClr>
+          </a:lnRef>
+          <a:fillRef idx="1">
+            <a:schemeClr val="accent1"/>
+          </a:fillRef>
+          <a:effectRef idx="0">
+            <a:schemeClr val="accent1"/>
+          </a:effectRef>
+          <a:fontRef idx="minor">
+            <a:schemeClr val="lt1"/>
+          </a:fontRef>
+        </p:style>
+        <p:txBody>
+          <a:bodyPr rtlCol="0" anchor="ctr"/>
+          <a:lstStyle/>
+          <a:p>
+            <a:pPr marL="0" marR="0" lvl="0" indent="0" algn="ctr" defTabSz="914400" rtl="0" eaLnBrk="1" fontAlgn="auto" latinLnBrk="0" hangingPunct="1">
+              <a:lnSpc>
+                <a:spcPct val="100000"/>
+              </a:lnSpc>
+              <a:spcBef>
+                <a:spcPts val="0"/>
+              </a:spcBef>
+              <a:spcAft>
+                <a:spcPts val="0"/>
+              </a:spcAft>
+              <a:buClrTx/>
+              <a:buSzTx/>
+              <a:buFontTx/>
+              <a:buNone/>
+              <a:tabLst/>
+              <a:defRPr/>
+            </a:pPr>
+            <a:endParaRPr kumimoji="0" lang="en-US" sz="1800" b="0" i="0" u="none" strike="noStrike" kern="1200" cap="none" spc="0" normalizeH="0" baseline="0" noProof="0" dirty="0">
+              <a:ln>
+                <a:noFill/>
+              </a:ln>
+              <a:solidFill>
+                <a:prstClr val="white"/>
+              </a:solidFill>
+              <a:effectLst/>
+              <a:uLnTx/>
+              <a:uFillTx/>
+              <a:latin typeface="Montserrat"/>
+              <a:ea typeface="+mn-ea"/>
+              <a:cs typeface="+mn-cs"/>
+            </a:endParaRPr>
+          </a:p>
+        </p:txBody>
+      </p:sp>
+      <p:sp>
+        <p:nvSpPr>
+          <p:cNvPr id="13" name="Oval 12">
+            <a:extLst>
+              <a:ext uri="{FF2B5EF4-FFF2-40B4-BE49-F238E27FC236}">
+                <a16:creationId xmlns:a16="http://schemas.microsoft.com/office/drawing/2014/main" id="{5338BC99-AC7D-49D4-B253-9BECC4D02BD7}"/>
+              </a:ext>
+            </a:extLst>
+          </p:cNvPr>
+          <p:cNvSpPr/>
+          <p:nvPr/>
+        </p:nvSpPr>
+        <p:spPr>
+          <a:xfrm>
+            <a:off x="9896676" y="804464"/>
+            <a:ext cx="262560" cy="262560"/>
+          </a:xfrm>
+          <a:prstGeom prst="ellipse">
+            <a:avLst/>
+          </a:prstGeom>
+          <a:solidFill>
+            <a:schemeClr val="bg1"/>
+          </a:solidFill>
+          <a:ln>
+            <a:noFill/>
+          </a:ln>
+        </p:spPr>
+        <p:style>
+          <a:lnRef idx="2">
+            <a:schemeClr val="accent1">
+              <a:shade val="50000"/>
+            </a:schemeClr>
+          </a:lnRef>
+          <a:fillRef idx="1">
+            <a:schemeClr val="accent1"/>
+          </a:fillRef>
+          <a:effectRef idx="0">
+            <a:schemeClr val="accent1"/>
+          </a:effectRef>
+          <a:fontRef idx="minor">
+            <a:schemeClr val="lt1"/>
+          </a:fontRef>
+        </p:style>
+        <p:txBody>
+          <a:bodyPr rtlCol="0" anchor="ctr"/>
+          <a:lstStyle/>
+          <a:p>
+            <a:pPr marL="0" marR="0" lvl="0" indent="0" algn="ctr" defTabSz="914400" rtl="0" eaLnBrk="1" fontAlgn="auto" latinLnBrk="0" hangingPunct="1">
+              <a:lnSpc>
+                <a:spcPct val="100000"/>
+              </a:lnSpc>
+              <a:spcBef>
+                <a:spcPts val="0"/>
+              </a:spcBef>
+              <a:spcAft>
+                <a:spcPts val="0"/>
+              </a:spcAft>
+              <a:buClrTx/>
+              <a:buSzTx/>
+              <a:buFontTx/>
+              <a:buNone/>
+              <a:tabLst/>
+              <a:defRPr/>
+            </a:pPr>
+            <a:endParaRPr kumimoji="0" lang="en-US" sz="1800" b="0" i="0" u="none" strike="noStrike" kern="1200" cap="none" spc="0" normalizeH="0" baseline="0" noProof="0" dirty="0">
+              <a:ln>
+                <a:noFill/>
+              </a:ln>
+              <a:solidFill>
+                <a:prstClr val="white"/>
+              </a:solidFill>
+              <a:effectLst/>
+              <a:uLnTx/>
+              <a:uFillTx/>
+              <a:latin typeface="Montserrat"/>
+              <a:ea typeface="+mn-ea"/>
+              <a:cs typeface="+mn-cs"/>
+            </a:endParaRPr>
+          </a:p>
+        </p:txBody>
+      </p:sp>
+      <p:sp>
+        <p:nvSpPr>
+          <p:cNvPr id="14" name="Freeform: Shape 13">
+            <a:extLst>
+              <a:ext uri="{FF2B5EF4-FFF2-40B4-BE49-F238E27FC236}">
+                <a16:creationId xmlns:a16="http://schemas.microsoft.com/office/drawing/2014/main" id="{A685EDDA-22C7-44D4-9D0C-9FC0D2D7D692}"/>
+              </a:ext>
+            </a:extLst>
+          </p:cNvPr>
+          <p:cNvSpPr/>
+          <p:nvPr/>
+        </p:nvSpPr>
+        <p:spPr>
+          <a:xfrm>
+            <a:off x="12056564" y="5480994"/>
+            <a:ext cx="131280" cy="262560"/>
+          </a:xfrm>
+          <a:custGeom>
+            <a:avLst/>
+            <a:gdLst>
+              <a:gd name="connsiteX0" fmla="*/ 131280 w 131280"/>
+              <a:gd name="connsiteY0" fmla="*/ 0 h 262560"/>
+              <a:gd name="connsiteX1" fmla="*/ 131280 w 131280"/>
+              <a:gd name="connsiteY1" fmla="*/ 262560 h 262560"/>
+              <a:gd name="connsiteX2" fmla="*/ 0 w 131280"/>
+              <a:gd name="connsiteY2" fmla="*/ 131280 h 262560"/>
+              <a:gd name="connsiteX3" fmla="*/ 131280 w 131280"/>
+              <a:gd name="connsiteY3" fmla="*/ 0 h 262560"/>
+            </a:gdLst>
+            <a:ahLst/>
+            <a:cxnLst>
+              <a:cxn ang="0">
+                <a:pos x="connsiteX0" y="connsiteY0"/>
+              </a:cxn>
+              <a:cxn ang="0">
+                <a:pos x="connsiteX1" y="connsiteY1"/>
+              </a:cxn>
+              <a:cxn ang="0">
+                <a:pos x="connsiteX2" y="connsiteY2"/>
+              </a:cxn>
+              <a:cxn ang="0">
+                <a:pos x="connsiteX3" y="connsiteY3"/>
+              </a:cxn>
+            </a:cxnLst>
+            <a:rect l="l" t="t" r="r" b="b"/>
+            <a:pathLst>
+              <a:path w="131280" h="262560">
+                <a:moveTo>
+                  <a:pt x="131280" y="0"/>
+                </a:moveTo>
+                <a:lnTo>
+                  <a:pt x="131280" y="262560"/>
+                </a:lnTo>
+                <a:cubicBezTo>
+                  <a:pt x="58776" y="262560"/>
+                  <a:pt x="0" y="203784"/>
+                  <a:pt x="0" y="131280"/>
+                </a:cubicBezTo>
+                <a:cubicBezTo>
+                  <a:pt x="0" y="58776"/>
+                  <a:pt x="58776" y="0"/>
+                  <a:pt x="131280" y="0"/>
+                </a:cubicBezTo>
+                <a:close/>
+              </a:path>
+            </a:pathLst>
+          </a:custGeom>
+          <a:solidFill>
+            <a:schemeClr val="bg2">
+              <a:lumMod val="25000"/>
+            </a:schemeClr>
+          </a:solidFill>
+          <a:ln>
+            <a:noFill/>
+          </a:ln>
+        </p:spPr>
+        <p:style>
+          <a:lnRef idx="2">
+            <a:schemeClr val="accent1">
+              <a:shade val="50000"/>
+            </a:schemeClr>
+          </a:lnRef>
+          <a:fillRef idx="1">
+            <a:schemeClr val="accent1"/>
+          </a:fillRef>
+          <a:effectRef idx="0">
+            <a:schemeClr val="accent1"/>
+          </a:effectRef>
+          <a:fontRef idx="minor">
+            <a:schemeClr val="lt1"/>
+          </a:fontRef>
+        </p:style>
+        <p:txBody>
+          <a:bodyPr wrap="square" rtlCol="0" anchor="ctr">
+            <a:noAutofit/>
+          </a:bodyPr>
+          <a:lstStyle/>
+          <a:p>
+            <a:pPr marL="0" marR="0" lvl="0" indent="0" algn="ctr" defTabSz="914400" rtl="0" eaLnBrk="1" fontAlgn="auto" latinLnBrk="0" hangingPunct="1">
+              <a:lnSpc>
+                <a:spcPct val="100000"/>
+              </a:lnSpc>
+              <a:spcBef>
+                <a:spcPts val="0"/>
+              </a:spcBef>
+              <a:spcAft>
+                <a:spcPts val="0"/>
+              </a:spcAft>
+              <a:buClrTx/>
+              <a:buSzTx/>
+              <a:buFontTx/>
+              <a:buNone/>
+              <a:tabLst/>
+              <a:defRPr/>
+            </a:pPr>
+            <a:endParaRPr kumimoji="0" lang="en-US" sz="1800" b="0" i="0" u="none" strike="noStrike" kern="1200" cap="none" spc="0" normalizeH="0" baseline="0" noProof="0" dirty="0">
+              <a:ln>
+                <a:noFill/>
+              </a:ln>
+              <a:solidFill>
+                <a:prstClr val="white"/>
+              </a:solidFill>
+              <a:effectLst/>
+              <a:uLnTx/>
+              <a:uFillTx/>
+              <a:latin typeface="Montserrat"/>
+              <a:ea typeface="+mn-ea"/>
+              <a:cs typeface="+mn-cs"/>
+            </a:endParaRPr>
+          </a:p>
+        </p:txBody>
+      </p:sp>
+      <p:sp>
+        <p:nvSpPr>
+          <p:cNvPr id="15" name="Freeform: Shape 14">
+            <a:extLst>
+              <a:ext uri="{FF2B5EF4-FFF2-40B4-BE49-F238E27FC236}">
+                <a16:creationId xmlns:a16="http://schemas.microsoft.com/office/drawing/2014/main" id="{BA9721E0-EABB-414E-915A-D5E788EA85AB}"/>
+              </a:ext>
+            </a:extLst>
+          </p:cNvPr>
+          <p:cNvSpPr/>
+          <p:nvPr/>
+        </p:nvSpPr>
+        <p:spPr>
+          <a:xfrm>
+            <a:off x="12066089" y="1139742"/>
+            <a:ext cx="131280" cy="262560"/>
+          </a:xfrm>
+          <a:custGeom>
+            <a:avLst/>
+            <a:gdLst>
+              <a:gd name="connsiteX0" fmla="*/ 131280 w 131280"/>
+              <a:gd name="connsiteY0" fmla="*/ 0 h 262560"/>
+              <a:gd name="connsiteX1" fmla="*/ 131280 w 131280"/>
+              <a:gd name="connsiteY1" fmla="*/ 262560 h 262560"/>
+              <a:gd name="connsiteX2" fmla="*/ 0 w 131280"/>
+              <a:gd name="connsiteY2" fmla="*/ 131280 h 262560"/>
+              <a:gd name="connsiteX3" fmla="*/ 131280 w 131280"/>
+              <a:gd name="connsiteY3" fmla="*/ 0 h 262560"/>
+            </a:gdLst>
+            <a:ahLst/>
+            <a:cxnLst>
+              <a:cxn ang="0">
+                <a:pos x="connsiteX0" y="connsiteY0"/>
+              </a:cxn>
+              <a:cxn ang="0">
+                <a:pos x="connsiteX1" y="connsiteY1"/>
+              </a:cxn>
+              <a:cxn ang="0">
+                <a:pos x="connsiteX2" y="connsiteY2"/>
+              </a:cxn>
+              <a:cxn ang="0">
+                <a:pos x="connsiteX3" y="connsiteY3"/>
+              </a:cxn>
+            </a:cxnLst>
+            <a:rect l="l" t="t" r="r" b="b"/>
+            <a:pathLst>
+              <a:path w="131280" h="262560">
+                <a:moveTo>
+                  <a:pt x="131280" y="0"/>
+                </a:moveTo>
+                <a:lnTo>
+                  <a:pt x="131280" y="262560"/>
+                </a:lnTo>
+                <a:cubicBezTo>
+                  <a:pt x="58776" y="262560"/>
+                  <a:pt x="0" y="203784"/>
+                  <a:pt x="0" y="131280"/>
+                </a:cubicBezTo>
+                <a:cubicBezTo>
+                  <a:pt x="0" y="58776"/>
+                  <a:pt x="58776" y="0"/>
+                  <a:pt x="131280" y="0"/>
+                </a:cubicBezTo>
+                <a:close/>
+              </a:path>
+            </a:pathLst>
+          </a:custGeom>
+          <a:solidFill>
+            <a:schemeClr val="bg1"/>
+          </a:solidFill>
+          <a:ln>
+            <a:noFill/>
+          </a:ln>
+        </p:spPr>
+        <p:style>
+          <a:lnRef idx="2">
+            <a:schemeClr val="accent1">
+              <a:shade val="50000"/>
+            </a:schemeClr>
+          </a:lnRef>
+          <a:fillRef idx="1">
+            <a:schemeClr val="accent1"/>
+          </a:fillRef>
+          <a:effectRef idx="0">
+            <a:schemeClr val="accent1"/>
+          </a:effectRef>
+          <a:fontRef idx="minor">
+            <a:schemeClr val="lt1"/>
+          </a:fontRef>
+        </p:style>
+        <p:txBody>
+          <a:bodyPr wrap="square" rtlCol="0" anchor="ctr">
+            <a:noAutofit/>
+          </a:bodyPr>
+          <a:lstStyle/>
+          <a:p>
+            <a:pPr marL="0" marR="0" lvl="0" indent="0" algn="ctr" defTabSz="914400" rtl="0" eaLnBrk="1" fontAlgn="auto" latinLnBrk="0" hangingPunct="1">
+              <a:lnSpc>
+                <a:spcPct val="100000"/>
+              </a:lnSpc>
+              <a:spcBef>
+                <a:spcPts val="0"/>
+              </a:spcBef>
+              <a:spcAft>
+                <a:spcPts val="0"/>
+              </a:spcAft>
+              <a:buClrTx/>
+              <a:buSzTx/>
+              <a:buFontTx/>
+              <a:buNone/>
+              <a:tabLst/>
+              <a:defRPr/>
+            </a:pPr>
+            <a:endParaRPr kumimoji="0" lang="en-US" sz="1800" b="0" i="0" u="none" strike="noStrike" kern="1200" cap="none" spc="0" normalizeH="0" baseline="0" noProof="0" dirty="0">
+              <a:ln>
+                <a:noFill/>
+              </a:ln>
+              <a:solidFill>
+                <a:prstClr val="white"/>
+              </a:solidFill>
+              <a:effectLst/>
+              <a:uLnTx/>
+              <a:uFillTx/>
+              <a:latin typeface="Montserrat"/>
+              <a:ea typeface="+mn-ea"/>
+              <a:cs typeface="+mn-cs"/>
+            </a:endParaRPr>
+          </a:p>
+        </p:txBody>
+      </p:sp>
+      <p:sp>
+        <p:nvSpPr>
+          <p:cNvPr id="16" name="Freeform: Shape 15">
+            <a:extLst>
+              <a:ext uri="{FF2B5EF4-FFF2-40B4-BE49-F238E27FC236}">
+                <a16:creationId xmlns:a16="http://schemas.microsoft.com/office/drawing/2014/main" id="{2450B8BF-3AF3-4F9E-BF8D-2F89F9BBE510}"/>
+              </a:ext>
+            </a:extLst>
+          </p:cNvPr>
+          <p:cNvSpPr/>
+          <p:nvPr/>
+        </p:nvSpPr>
+        <p:spPr>
+          <a:xfrm rot="5400000">
+            <a:off x="6233560" y="6661080"/>
+            <a:ext cx="131280" cy="262560"/>
+          </a:xfrm>
+          <a:custGeom>
+            <a:avLst/>
+            <a:gdLst>
+              <a:gd name="connsiteX0" fmla="*/ 131280 w 131280"/>
+              <a:gd name="connsiteY0" fmla="*/ 0 h 262560"/>
+              <a:gd name="connsiteX1" fmla="*/ 131280 w 131280"/>
+              <a:gd name="connsiteY1" fmla="*/ 262560 h 262560"/>
+              <a:gd name="connsiteX2" fmla="*/ 0 w 131280"/>
+              <a:gd name="connsiteY2" fmla="*/ 131280 h 262560"/>
+              <a:gd name="connsiteX3" fmla="*/ 131280 w 131280"/>
+              <a:gd name="connsiteY3" fmla="*/ 0 h 262560"/>
+            </a:gdLst>
+            <a:ahLst/>
+            <a:cxnLst>
+              <a:cxn ang="0">
+                <a:pos x="connsiteX0" y="connsiteY0"/>
+              </a:cxn>
+              <a:cxn ang="0">
+                <a:pos x="connsiteX1" y="connsiteY1"/>
+              </a:cxn>
+              <a:cxn ang="0">
+                <a:pos x="connsiteX2" y="connsiteY2"/>
+              </a:cxn>
+              <a:cxn ang="0">
+                <a:pos x="connsiteX3" y="connsiteY3"/>
+              </a:cxn>
+            </a:cxnLst>
+            <a:rect l="l" t="t" r="r" b="b"/>
+            <a:pathLst>
+              <a:path w="131280" h="262560">
+                <a:moveTo>
+                  <a:pt x="131280" y="0"/>
+                </a:moveTo>
+                <a:lnTo>
+                  <a:pt x="131280" y="262560"/>
+                </a:lnTo>
+                <a:cubicBezTo>
+                  <a:pt x="58776" y="262560"/>
+                  <a:pt x="0" y="203784"/>
+                  <a:pt x="0" y="131280"/>
+                </a:cubicBezTo>
+                <a:cubicBezTo>
+                  <a:pt x="0" y="58776"/>
+                  <a:pt x="58776" y="0"/>
+                  <a:pt x="131280" y="0"/>
+                </a:cubicBezTo>
+                <a:close/>
+              </a:path>
+            </a:pathLst>
+          </a:custGeom>
+          <a:solidFill>
+            <a:schemeClr val="bg2">
+              <a:lumMod val="25000"/>
+            </a:schemeClr>
+          </a:solidFill>
+          <a:ln>
+            <a:noFill/>
+          </a:ln>
+        </p:spPr>
+        <p:style>
+          <a:lnRef idx="2">
+            <a:schemeClr val="accent1">
+              <a:shade val="50000"/>
+            </a:schemeClr>
+          </a:lnRef>
+          <a:fillRef idx="1">
+            <a:schemeClr val="accent1"/>
+          </a:fillRef>
+          <a:effectRef idx="0">
+            <a:schemeClr val="accent1"/>
+          </a:effectRef>
+          <a:fontRef idx="minor">
+            <a:schemeClr val="lt1"/>
+          </a:fontRef>
+        </p:style>
+        <p:txBody>
+          <a:bodyPr wrap="square" rtlCol="0" anchor="ctr">
+            <a:noAutofit/>
+          </a:bodyPr>
+          <a:lstStyle/>
+          <a:p>
+            <a:pPr marL="0" marR="0" lvl="0" indent="0" algn="ctr" defTabSz="914400" rtl="0" eaLnBrk="1" fontAlgn="auto" latinLnBrk="0" hangingPunct="1">
+              <a:lnSpc>
+                <a:spcPct val="100000"/>
+              </a:lnSpc>
+              <a:spcBef>
+                <a:spcPts val="0"/>
+              </a:spcBef>
+              <a:spcAft>
+                <a:spcPts val="0"/>
+              </a:spcAft>
+              <a:buClrTx/>
+              <a:buSzTx/>
+              <a:buFontTx/>
+              <a:buNone/>
+              <a:tabLst/>
+              <a:defRPr/>
+            </a:pPr>
+            <a:endParaRPr kumimoji="0" lang="en-US" sz="1800" b="0" i="0" u="none" strike="noStrike" kern="1200" cap="none" spc="0" normalizeH="0" baseline="0" noProof="0" dirty="0">
+              <a:ln>
+                <a:noFill/>
+              </a:ln>
+              <a:solidFill>
+                <a:prstClr val="white"/>
+              </a:solidFill>
+              <a:effectLst/>
+              <a:uLnTx/>
+              <a:uFillTx/>
+              <a:latin typeface="Montserrat"/>
+              <a:ea typeface="+mn-ea"/>
+              <a:cs typeface="+mn-cs"/>
+            </a:endParaRPr>
+          </a:p>
+        </p:txBody>
+      </p:sp>
+      <p:sp>
+        <p:nvSpPr>
+          <p:cNvPr id="55" name="TextBox 54">
+            <a:extLst>
+              <a:ext uri="{FF2B5EF4-FFF2-40B4-BE49-F238E27FC236}">
+                <a16:creationId xmlns:a16="http://schemas.microsoft.com/office/drawing/2014/main" id="{E293866C-A9ED-43DE-807A-A9F13875F9F5}"/>
+              </a:ext>
+            </a:extLst>
+          </p:cNvPr>
+          <p:cNvSpPr txBox="1"/>
+          <p:nvPr/>
+        </p:nvSpPr>
+        <p:spPr>
+          <a:xfrm>
+            <a:off x="2164044" y="218746"/>
+            <a:ext cx="8126062" cy="830997"/>
+          </a:xfrm>
+          <a:prstGeom prst="rect">
+            <a:avLst/>
+          </a:prstGeom>
+          <a:noFill/>
+        </p:spPr>
+        <p:txBody>
+          <a:bodyPr wrap="square" rtlCol="0">
+            <a:spAutoFit/>
+          </a:bodyPr>
+          <a:lstStyle/>
+          <a:p>
+            <a:pPr marL="0" marR="0" lvl="0" indent="0" algn="ctr" defTabSz="914400" rtl="0" eaLnBrk="1" fontAlgn="auto" latinLnBrk="0" hangingPunct="1">
+              <a:lnSpc>
+                <a:spcPct val="100000"/>
+              </a:lnSpc>
+              <a:spcBef>
+                <a:spcPts val="0"/>
+              </a:spcBef>
+              <a:spcAft>
+                <a:spcPts val="0"/>
+              </a:spcAft>
+              <a:buClrTx/>
+              <a:buSzTx/>
+              <a:buFontTx/>
+              <a:buNone/>
+              <a:tabLst/>
+              <a:defRPr/>
+            </a:pPr>
+            <a:r>
+              <a:rPr kumimoji="0" lang="en-US" sz="4800" b="1" i="0" u="none" strike="noStrike" kern="1200" cap="none" spc="0" normalizeH="0" baseline="0" noProof="0" dirty="0">
+                <a:ln>
+                  <a:solidFill>
+                    <a:srgbClr val="E7E6E6">
+                      <a:lumMod val="50000"/>
+                    </a:srgbClr>
+                  </a:solidFill>
+                </a:ln>
+                <a:solidFill>
+                  <a:prstClr val="white">
+                    <a:lumMod val="95000"/>
+                  </a:prstClr>
+                </a:solidFill>
+                <a:effectLst/>
+                <a:uLnTx/>
+                <a:uFillTx/>
+                <a:latin typeface="Tw Cen MT" panose="020B0602020104020603" pitchFamily="34" charset="0"/>
+                <a:ea typeface="+mn-ea"/>
+                <a:cs typeface="+mn-cs"/>
+              </a:rPr>
+              <a:t>Quality Assurance</a:t>
+            </a:r>
+          </a:p>
+        </p:txBody>
+      </p:sp>
+      <p:pic>
+        <p:nvPicPr>
+          <p:cNvPr id="18" name="Picture 17">
+            <a:extLst>
+              <a:ext uri="{FF2B5EF4-FFF2-40B4-BE49-F238E27FC236}">
+                <a16:creationId xmlns:a16="http://schemas.microsoft.com/office/drawing/2014/main" id="{769BD99E-ED02-7BEF-4E49-81DCDA9F72F9}"/>
+              </a:ext>
+            </a:extLst>
+          </p:cNvPr>
+          <p:cNvPicPr>
+            <a:picLocks noChangeAspect="1"/>
+          </p:cNvPicPr>
+          <p:nvPr/>
+        </p:nvPicPr>
+        <p:blipFill>
+          <a:blip r:embed="rId2"/>
+          <a:stretch>
+            <a:fillRect/>
+          </a:stretch>
+        </p:blipFill>
+        <p:spPr>
+          <a:xfrm>
+            <a:off x="769874" y="3986797"/>
+            <a:ext cx="262151" cy="268247"/>
+          </a:xfrm>
+          <a:prstGeom prst="rect">
+            <a:avLst/>
+          </a:prstGeom>
+        </p:spPr>
+      </p:pic>
+      <p:pic>
+        <p:nvPicPr>
+          <p:cNvPr id="19" name="Picture 18">
+            <a:extLst>
+              <a:ext uri="{FF2B5EF4-FFF2-40B4-BE49-F238E27FC236}">
+                <a16:creationId xmlns:a16="http://schemas.microsoft.com/office/drawing/2014/main" id="{192B6CDB-EE5C-C43F-F439-D844EDC58453}"/>
+              </a:ext>
+            </a:extLst>
+          </p:cNvPr>
+          <p:cNvPicPr>
+            <a:picLocks noChangeAspect="1"/>
+          </p:cNvPicPr>
+          <p:nvPr/>
+        </p:nvPicPr>
+        <p:blipFill>
+          <a:blip r:embed="rId3"/>
+          <a:stretch>
+            <a:fillRect/>
+          </a:stretch>
+        </p:blipFill>
+        <p:spPr>
+          <a:xfrm>
+            <a:off x="1645130" y="5514280"/>
+            <a:ext cx="158510" cy="158510"/>
+          </a:xfrm>
+          <a:prstGeom prst="rect">
+            <a:avLst/>
+          </a:prstGeom>
+        </p:spPr>
+      </p:pic>
+      <p:sp>
+        <p:nvSpPr>
+          <p:cNvPr id="17" name="TextBox 16">
+            <a:extLst>
+              <a:ext uri="{FF2B5EF4-FFF2-40B4-BE49-F238E27FC236}">
+                <a16:creationId xmlns:a16="http://schemas.microsoft.com/office/drawing/2014/main" id="{55CBF261-CB5F-5F18-DB07-D4E0CF9A7D72}"/>
+              </a:ext>
+            </a:extLst>
+          </p:cNvPr>
+          <p:cNvSpPr txBox="1"/>
+          <p:nvPr/>
+        </p:nvSpPr>
+        <p:spPr>
+          <a:xfrm>
+            <a:off x="1905865" y="1243349"/>
+            <a:ext cx="4719562" cy="369332"/>
+          </a:xfrm>
+          <a:prstGeom prst="rect">
+            <a:avLst/>
+          </a:prstGeom>
+          <a:noFill/>
+        </p:spPr>
+        <p:txBody>
+          <a:bodyPr wrap="none" rtlCol="0">
+            <a:spAutoFit/>
+          </a:bodyPr>
+          <a:lstStyle/>
+          <a:p>
+            <a:pPr marL="285750" marR="0" lvl="0" indent="-285750" algn="l" defTabSz="914400" rtl="0" eaLnBrk="1" fontAlgn="auto" latinLnBrk="0" hangingPunct="1">
+              <a:lnSpc>
+                <a:spcPct val="100000"/>
+              </a:lnSpc>
+              <a:spcBef>
+                <a:spcPts val="0"/>
+              </a:spcBef>
+              <a:spcAft>
+                <a:spcPts val="0"/>
+              </a:spcAft>
+              <a:buClrTx/>
+              <a:buSzTx/>
+              <a:buFont typeface="Wingdings" panose="05000000000000000000" pitchFamily="2" charset="2"/>
+              <a:buChar char="Ø"/>
+              <a:tabLst/>
+              <a:defRPr/>
+            </a:pPr>
+            <a:r>
+              <a:rPr kumimoji="0" lang="en-ZA" sz="1800" b="0" i="0" u="none" strike="noStrike" kern="1200" cap="none" spc="0" normalizeH="0" baseline="0" noProof="0" dirty="0">
+                <a:ln>
+                  <a:noFill/>
+                </a:ln>
+                <a:solidFill>
+                  <a:prstClr val="white"/>
+                </a:solidFill>
+                <a:effectLst/>
+                <a:uLnTx/>
+                <a:uFillTx/>
+                <a:latin typeface="Montserrat"/>
+                <a:ea typeface="+mn-ea"/>
+                <a:cs typeface="+mn-cs"/>
+              </a:rPr>
+              <a:t>Code coverage is currently at 80.67%</a:t>
+            </a:r>
+          </a:p>
+        </p:txBody>
+      </p:sp>
+      <p:pic>
+        <p:nvPicPr>
+          <p:cNvPr id="4" name="Picture 3" descr="A screenshot of a graph&#10;&#10;Description automatically generated">
+            <a:extLst>
+              <a:ext uri="{FF2B5EF4-FFF2-40B4-BE49-F238E27FC236}">
+                <a16:creationId xmlns:a16="http://schemas.microsoft.com/office/drawing/2014/main" id="{0E61F668-5756-D40C-4440-CA2E38DD9DC0}"/>
+              </a:ext>
+            </a:extLst>
+          </p:cNvPr>
+          <p:cNvPicPr>
+            <a:picLocks noChangeAspect="1"/>
+          </p:cNvPicPr>
+          <p:nvPr/>
+        </p:nvPicPr>
+        <p:blipFill>
+          <a:blip r:embed="rId4">
+            <a:extLst>
+              <a:ext uri="{28A0092B-C50C-407E-A947-70E740481C1C}">
+                <a14:useLocalDpi xmlns:a14="http://schemas.microsoft.com/office/drawing/2010/main" val="0"/>
+              </a:ext>
+            </a:extLst>
+          </a:blip>
+          <a:stretch>
+            <a:fillRect/>
+          </a:stretch>
+        </p:blipFill>
+        <p:spPr>
+          <a:xfrm>
+            <a:off x="1905865" y="1822210"/>
+            <a:ext cx="8786669" cy="4331180"/>
+          </a:xfrm>
+          <a:prstGeom prst="rect">
+            <a:avLst/>
+          </a:prstGeom>
+        </p:spPr>
+      </p:pic>
+    </p:spTree>
+    <p:extLst>
+      <p:ext uri="{BB962C8B-B14F-4D97-AF65-F5344CB8AC3E}">
+        <p14:creationId xmlns:p14="http://schemas.microsoft.com/office/powerpoint/2010/main" val="1512265563"/>
+      </p:ext>
+    </p:extLst>
+  </p:cSld>
+  <p:clrMapOvr>
+    <a:masterClrMapping/>
+  </p:clrMapOvr>
+</p:sld>
+</file>
+
+<file path=ppt/slides/slide11.xml><?xml version="1.0" encoding="utf-8"?>
+<p:sld xmlns:a="http://schemas.openxmlformats.org/drawingml/2006/main" xmlns:r="http://schemas.openxmlformats.org/officeDocument/2006/relationships" xmlns:p="http://schemas.openxmlformats.org/presentationml/2006/main">
+  <p:cSld>
+    <p:bg>
+      <p:bgPr>
+        <a:solidFill>
+          <a:srgbClr val="DE283B"/>
+        </a:solidFill>
+        <a:effectLst/>
+      </p:bgPr>
+    </p:bg>
+    <p:spTree>
+      <p:nvGrpSpPr>
+        <p:cNvPr id="1" name=""/>
+        <p:cNvGrpSpPr/>
+        <p:nvPr/>
+      </p:nvGrpSpPr>
+      <p:grpSpPr>
+        <a:xfrm>
+          <a:off x="0" y="0"/>
+          <a:ext cx="0" cy="0"/>
+          <a:chOff x="0" y="0"/>
+          <a:chExt cx="0" cy="0"/>
+        </a:xfrm>
+      </p:grpSpPr>
+      <p:sp>
+        <p:nvSpPr>
+          <p:cNvPr id="6" name="Oval 5">
+            <a:extLst>
+              <a:ext uri="{FF2B5EF4-FFF2-40B4-BE49-F238E27FC236}">
+                <a16:creationId xmlns:a16="http://schemas.microsoft.com/office/drawing/2014/main" id="{0A4ABBFC-76A7-4FC2-A983-AB55DB1BF542}"/>
+              </a:ext>
+            </a:extLst>
+          </p:cNvPr>
+          <p:cNvSpPr/>
+          <p:nvPr/>
+        </p:nvSpPr>
+        <p:spPr>
+          <a:xfrm>
+            <a:off x="1032025" y="673184"/>
+            <a:ext cx="262560" cy="262560"/>
+          </a:xfrm>
+          <a:prstGeom prst="ellipse">
+            <a:avLst/>
+          </a:prstGeom>
+          <a:solidFill>
+            <a:schemeClr val="bg1"/>
+          </a:solidFill>
+          <a:ln>
+            <a:noFill/>
+          </a:ln>
+        </p:spPr>
+        <p:style>
+          <a:lnRef idx="2">
+            <a:schemeClr val="accent1">
+              <a:shade val="50000"/>
+            </a:schemeClr>
+          </a:lnRef>
+          <a:fillRef idx="1">
+            <a:schemeClr val="accent1"/>
+          </a:fillRef>
+          <a:effectRef idx="0">
+            <a:schemeClr val="accent1"/>
+          </a:effectRef>
+          <a:fontRef idx="minor">
+            <a:schemeClr val="lt1"/>
+          </a:fontRef>
+        </p:style>
+        <p:txBody>
+          <a:bodyPr rtlCol="0" anchor="ctr"/>
+          <a:lstStyle/>
+          <a:p>
+            <a:pPr marL="0" marR="0" lvl="0" indent="0" algn="ctr" defTabSz="914400" rtl="0" eaLnBrk="1" fontAlgn="auto" latinLnBrk="0" hangingPunct="1">
+              <a:lnSpc>
+                <a:spcPct val="100000"/>
+              </a:lnSpc>
+              <a:spcBef>
+                <a:spcPts val="0"/>
+              </a:spcBef>
+              <a:spcAft>
+                <a:spcPts val="0"/>
+              </a:spcAft>
+              <a:buClrTx/>
+              <a:buSzTx/>
+              <a:buFontTx/>
+              <a:buNone/>
+              <a:tabLst/>
+              <a:defRPr/>
+            </a:pPr>
+            <a:endParaRPr kumimoji="0" lang="en-US" sz="1800" b="0" i="0" u="none" strike="noStrike" kern="1200" cap="none" spc="0" normalizeH="0" baseline="0" noProof="0" dirty="0">
+              <a:ln>
+                <a:noFill/>
+              </a:ln>
+              <a:solidFill>
+                <a:prstClr val="white"/>
+              </a:solidFill>
+              <a:effectLst/>
+              <a:uLnTx/>
+              <a:uFillTx/>
+              <a:latin typeface="Montserrat"/>
+              <a:ea typeface="+mn-ea"/>
+              <a:cs typeface="+mn-cs"/>
+            </a:endParaRPr>
+          </a:p>
+        </p:txBody>
+      </p:sp>
+      <p:sp>
+        <p:nvSpPr>
+          <p:cNvPr id="8" name="Freeform: Shape 7">
+            <a:extLst>
+              <a:ext uri="{FF2B5EF4-FFF2-40B4-BE49-F238E27FC236}">
+                <a16:creationId xmlns:a16="http://schemas.microsoft.com/office/drawing/2014/main" id="{D05ED739-895E-49AA-BBA0-0E1AEE15D56F}"/>
+              </a:ext>
+            </a:extLst>
+          </p:cNvPr>
+          <p:cNvSpPr/>
+          <p:nvPr/>
+        </p:nvSpPr>
+        <p:spPr>
+          <a:xfrm rot="10800000">
+            <a:off x="-871" y="6204894"/>
+            <a:ext cx="131280" cy="262560"/>
+          </a:xfrm>
+          <a:custGeom>
+            <a:avLst/>
+            <a:gdLst>
+              <a:gd name="connsiteX0" fmla="*/ 131280 w 131280"/>
+              <a:gd name="connsiteY0" fmla="*/ 0 h 262560"/>
+              <a:gd name="connsiteX1" fmla="*/ 131280 w 131280"/>
+              <a:gd name="connsiteY1" fmla="*/ 262560 h 262560"/>
+              <a:gd name="connsiteX2" fmla="*/ 0 w 131280"/>
+              <a:gd name="connsiteY2" fmla="*/ 131280 h 262560"/>
+              <a:gd name="connsiteX3" fmla="*/ 131280 w 131280"/>
+              <a:gd name="connsiteY3" fmla="*/ 0 h 262560"/>
+            </a:gdLst>
+            <a:ahLst/>
+            <a:cxnLst>
+              <a:cxn ang="0">
+                <a:pos x="connsiteX0" y="connsiteY0"/>
+              </a:cxn>
+              <a:cxn ang="0">
+                <a:pos x="connsiteX1" y="connsiteY1"/>
+              </a:cxn>
+              <a:cxn ang="0">
+                <a:pos x="connsiteX2" y="connsiteY2"/>
+              </a:cxn>
+              <a:cxn ang="0">
+                <a:pos x="connsiteX3" y="connsiteY3"/>
+              </a:cxn>
+            </a:cxnLst>
+            <a:rect l="l" t="t" r="r" b="b"/>
+            <a:pathLst>
+              <a:path w="131280" h="262560">
+                <a:moveTo>
+                  <a:pt x="131280" y="0"/>
+                </a:moveTo>
+                <a:lnTo>
+                  <a:pt x="131280" y="262560"/>
+                </a:lnTo>
+                <a:cubicBezTo>
+                  <a:pt x="58776" y="262560"/>
+                  <a:pt x="0" y="203784"/>
+                  <a:pt x="0" y="131280"/>
+                </a:cubicBezTo>
+                <a:cubicBezTo>
+                  <a:pt x="0" y="58776"/>
+                  <a:pt x="58776" y="0"/>
+                  <a:pt x="131280" y="0"/>
+                </a:cubicBezTo>
+                <a:close/>
+              </a:path>
+            </a:pathLst>
+          </a:custGeom>
+          <a:solidFill>
+            <a:schemeClr val="bg1"/>
+          </a:solidFill>
+          <a:ln>
+            <a:noFill/>
+          </a:ln>
+        </p:spPr>
+        <p:style>
+          <a:lnRef idx="2">
+            <a:schemeClr val="accent1">
+              <a:shade val="50000"/>
+            </a:schemeClr>
+          </a:lnRef>
+          <a:fillRef idx="1">
+            <a:schemeClr val="accent1"/>
+          </a:fillRef>
+          <a:effectRef idx="0">
+            <a:schemeClr val="accent1"/>
+          </a:effectRef>
+          <a:fontRef idx="minor">
+            <a:schemeClr val="lt1"/>
+          </a:fontRef>
+        </p:style>
+        <p:txBody>
+          <a:bodyPr wrap="square" rtlCol="0" anchor="ctr">
+            <a:noAutofit/>
+          </a:bodyPr>
+          <a:lstStyle/>
+          <a:p>
+            <a:pPr marL="0" marR="0" lvl="0" indent="0" algn="ctr" defTabSz="914400" rtl="0" eaLnBrk="1" fontAlgn="auto" latinLnBrk="0" hangingPunct="1">
+              <a:lnSpc>
+                <a:spcPct val="100000"/>
+              </a:lnSpc>
+              <a:spcBef>
+                <a:spcPts val="0"/>
+              </a:spcBef>
+              <a:spcAft>
+                <a:spcPts val="0"/>
+              </a:spcAft>
+              <a:buClrTx/>
+              <a:buSzTx/>
+              <a:buFontTx/>
+              <a:buNone/>
+              <a:tabLst/>
+              <a:defRPr/>
+            </a:pPr>
+            <a:endParaRPr kumimoji="0" lang="en-US" sz="1800" b="0" i="0" u="none" strike="noStrike" kern="1200" cap="none" spc="0" normalizeH="0" baseline="0" noProof="0" dirty="0">
+              <a:ln>
+                <a:noFill/>
+              </a:ln>
+              <a:solidFill>
+                <a:prstClr val="white"/>
+              </a:solidFill>
+              <a:effectLst/>
+              <a:uLnTx/>
+              <a:uFillTx/>
+              <a:latin typeface="Montserrat"/>
+              <a:ea typeface="+mn-ea"/>
+              <a:cs typeface="+mn-cs"/>
+            </a:endParaRPr>
+          </a:p>
+        </p:txBody>
+      </p:sp>
+      <p:sp>
+        <p:nvSpPr>
+          <p:cNvPr id="9" name="Freeform: Shape 8">
+            <a:extLst>
+              <a:ext uri="{FF2B5EF4-FFF2-40B4-BE49-F238E27FC236}">
+                <a16:creationId xmlns:a16="http://schemas.microsoft.com/office/drawing/2014/main" id="{D5447901-BA28-476E-94BF-5425985FA436}"/>
+              </a:ext>
+            </a:extLst>
+          </p:cNvPr>
+          <p:cNvSpPr/>
+          <p:nvPr/>
+        </p:nvSpPr>
+        <p:spPr>
+          <a:xfrm rot="10800000">
+            <a:off x="-871" y="1863642"/>
+            <a:ext cx="131280" cy="262560"/>
+          </a:xfrm>
+          <a:custGeom>
+            <a:avLst/>
+            <a:gdLst>
+              <a:gd name="connsiteX0" fmla="*/ 131280 w 131280"/>
+              <a:gd name="connsiteY0" fmla="*/ 0 h 262560"/>
+              <a:gd name="connsiteX1" fmla="*/ 131280 w 131280"/>
+              <a:gd name="connsiteY1" fmla="*/ 262560 h 262560"/>
+              <a:gd name="connsiteX2" fmla="*/ 0 w 131280"/>
+              <a:gd name="connsiteY2" fmla="*/ 131280 h 262560"/>
+              <a:gd name="connsiteX3" fmla="*/ 131280 w 131280"/>
+              <a:gd name="connsiteY3" fmla="*/ 0 h 262560"/>
+            </a:gdLst>
+            <a:ahLst/>
+            <a:cxnLst>
+              <a:cxn ang="0">
+                <a:pos x="connsiteX0" y="connsiteY0"/>
+              </a:cxn>
+              <a:cxn ang="0">
+                <a:pos x="connsiteX1" y="connsiteY1"/>
+              </a:cxn>
+              <a:cxn ang="0">
+                <a:pos x="connsiteX2" y="connsiteY2"/>
+              </a:cxn>
+              <a:cxn ang="0">
+                <a:pos x="connsiteX3" y="connsiteY3"/>
+              </a:cxn>
+            </a:cxnLst>
+            <a:rect l="l" t="t" r="r" b="b"/>
+            <a:pathLst>
+              <a:path w="131280" h="262560">
+                <a:moveTo>
+                  <a:pt x="131280" y="0"/>
+                </a:moveTo>
+                <a:lnTo>
+                  <a:pt x="131280" y="262560"/>
+                </a:lnTo>
+                <a:cubicBezTo>
+                  <a:pt x="58776" y="262560"/>
+                  <a:pt x="0" y="203784"/>
+                  <a:pt x="0" y="131280"/>
+                </a:cubicBezTo>
+                <a:cubicBezTo>
+                  <a:pt x="0" y="58776"/>
+                  <a:pt x="58776" y="0"/>
+                  <a:pt x="131280" y="0"/>
+                </a:cubicBezTo>
+                <a:close/>
+              </a:path>
+            </a:pathLst>
+          </a:custGeom>
+          <a:solidFill>
+            <a:schemeClr val="bg2">
+              <a:lumMod val="25000"/>
+            </a:schemeClr>
+          </a:solidFill>
+          <a:ln>
+            <a:noFill/>
+          </a:ln>
+        </p:spPr>
+        <p:style>
+          <a:lnRef idx="2">
+            <a:schemeClr val="accent1">
+              <a:shade val="50000"/>
+            </a:schemeClr>
+          </a:lnRef>
+          <a:fillRef idx="1">
+            <a:schemeClr val="accent1"/>
+          </a:fillRef>
+          <a:effectRef idx="0">
+            <a:schemeClr val="accent1"/>
+          </a:effectRef>
+          <a:fontRef idx="minor">
+            <a:schemeClr val="lt1"/>
+          </a:fontRef>
+        </p:style>
+        <p:txBody>
+          <a:bodyPr wrap="square" rtlCol="0" anchor="ctr">
+            <a:noAutofit/>
+          </a:bodyPr>
+          <a:lstStyle/>
+          <a:p>
+            <a:pPr marL="0" marR="0" lvl="0" indent="0" algn="ctr" defTabSz="914400" rtl="0" eaLnBrk="1" fontAlgn="auto" latinLnBrk="0" hangingPunct="1">
+              <a:lnSpc>
+                <a:spcPct val="100000"/>
+              </a:lnSpc>
+              <a:spcBef>
+                <a:spcPts val="0"/>
+              </a:spcBef>
+              <a:spcAft>
+                <a:spcPts val="0"/>
+              </a:spcAft>
+              <a:buClrTx/>
+              <a:buSzTx/>
+              <a:buFontTx/>
+              <a:buNone/>
+              <a:tabLst/>
+              <a:defRPr/>
+            </a:pPr>
+            <a:endParaRPr kumimoji="0" lang="en-US" sz="1800" b="0" i="0" u="none" strike="noStrike" kern="1200" cap="none" spc="0" normalizeH="0" baseline="0" noProof="0" dirty="0">
+              <a:ln>
+                <a:noFill/>
+              </a:ln>
+              <a:solidFill>
+                <a:prstClr val="white"/>
+              </a:solidFill>
+              <a:effectLst/>
+              <a:uLnTx/>
+              <a:uFillTx/>
+              <a:latin typeface="Montserrat"/>
+              <a:ea typeface="+mn-ea"/>
+              <a:cs typeface="+mn-cs"/>
+            </a:endParaRPr>
+          </a:p>
+        </p:txBody>
+      </p:sp>
+      <p:sp>
+        <p:nvSpPr>
+          <p:cNvPr id="10" name="Oval 9">
+            <a:extLst>
+              <a:ext uri="{FF2B5EF4-FFF2-40B4-BE49-F238E27FC236}">
+                <a16:creationId xmlns:a16="http://schemas.microsoft.com/office/drawing/2014/main" id="{B9732762-70FC-44FD-8026-6FC1020853A9}"/>
+              </a:ext>
+            </a:extLst>
+          </p:cNvPr>
+          <p:cNvSpPr/>
+          <p:nvPr/>
+        </p:nvSpPr>
+        <p:spPr>
+          <a:xfrm>
+            <a:off x="10848472" y="3340062"/>
+            <a:ext cx="158168" cy="158168"/>
+          </a:xfrm>
+          <a:prstGeom prst="ellipse">
+            <a:avLst/>
+          </a:prstGeom>
+          <a:solidFill>
+            <a:schemeClr val="bg2">
+              <a:lumMod val="25000"/>
+            </a:schemeClr>
+          </a:solidFill>
+          <a:ln>
+            <a:noFill/>
+          </a:ln>
+        </p:spPr>
+        <p:style>
+          <a:lnRef idx="2">
+            <a:schemeClr val="accent1">
+              <a:shade val="50000"/>
+            </a:schemeClr>
+          </a:lnRef>
+          <a:fillRef idx="1">
+            <a:schemeClr val="accent1"/>
+          </a:fillRef>
+          <a:effectRef idx="0">
+            <a:schemeClr val="accent1"/>
+          </a:effectRef>
+          <a:fontRef idx="minor">
+            <a:schemeClr val="lt1"/>
+          </a:fontRef>
+        </p:style>
+        <p:txBody>
+          <a:bodyPr rtlCol="0" anchor="ctr"/>
+          <a:lstStyle/>
+          <a:p>
+            <a:pPr marL="0" marR="0" lvl="0" indent="0" algn="ctr" defTabSz="914400" rtl="0" eaLnBrk="1" fontAlgn="auto" latinLnBrk="0" hangingPunct="1">
+              <a:lnSpc>
+                <a:spcPct val="100000"/>
+              </a:lnSpc>
+              <a:spcBef>
+                <a:spcPts val="0"/>
+              </a:spcBef>
+              <a:spcAft>
+                <a:spcPts val="0"/>
+              </a:spcAft>
+              <a:buClrTx/>
+              <a:buSzTx/>
+              <a:buFontTx/>
+              <a:buNone/>
+              <a:tabLst/>
+              <a:defRPr/>
+            </a:pPr>
+            <a:endParaRPr kumimoji="0" lang="en-US" sz="1800" b="0" i="0" u="none" strike="noStrike" kern="1200" cap="none" spc="0" normalizeH="0" baseline="0" noProof="0" dirty="0">
+              <a:ln>
+                <a:noFill/>
+              </a:ln>
+              <a:solidFill>
+                <a:prstClr val="white"/>
+              </a:solidFill>
+              <a:effectLst/>
+              <a:uLnTx/>
+              <a:uFillTx/>
+              <a:latin typeface="Montserrat"/>
+              <a:ea typeface="+mn-ea"/>
+              <a:cs typeface="+mn-cs"/>
+            </a:endParaRPr>
+          </a:p>
+        </p:txBody>
+      </p:sp>
+      <p:sp>
+        <p:nvSpPr>
+          <p:cNvPr id="11" name="Oval 10">
+            <a:extLst>
+              <a:ext uri="{FF2B5EF4-FFF2-40B4-BE49-F238E27FC236}">
+                <a16:creationId xmlns:a16="http://schemas.microsoft.com/office/drawing/2014/main" id="{7EA21643-1E5D-4645-8448-B1E8F9598926}"/>
+              </a:ext>
+            </a:extLst>
+          </p:cNvPr>
+          <p:cNvSpPr/>
+          <p:nvPr/>
+        </p:nvSpPr>
+        <p:spPr>
+          <a:xfrm>
+            <a:off x="10949025" y="673184"/>
+            <a:ext cx="158168" cy="158168"/>
+          </a:xfrm>
+          <a:prstGeom prst="ellipse">
+            <a:avLst/>
+          </a:prstGeom>
+          <a:solidFill>
+            <a:schemeClr val="bg2">
+              <a:lumMod val="25000"/>
+            </a:schemeClr>
+          </a:solidFill>
+          <a:ln>
+            <a:noFill/>
+          </a:ln>
+        </p:spPr>
+        <p:style>
+          <a:lnRef idx="2">
+            <a:schemeClr val="accent1">
+              <a:shade val="50000"/>
+            </a:schemeClr>
+          </a:lnRef>
+          <a:fillRef idx="1">
+            <a:schemeClr val="accent1"/>
+          </a:fillRef>
+          <a:effectRef idx="0">
+            <a:schemeClr val="accent1"/>
+          </a:effectRef>
+          <a:fontRef idx="minor">
+            <a:schemeClr val="lt1"/>
+          </a:fontRef>
+        </p:style>
+        <p:txBody>
+          <a:bodyPr rtlCol="0" anchor="ctr"/>
+          <a:lstStyle/>
+          <a:p>
+            <a:pPr marL="0" marR="0" lvl="0" indent="0" algn="ctr" defTabSz="914400" rtl="0" eaLnBrk="1" fontAlgn="auto" latinLnBrk="0" hangingPunct="1">
+              <a:lnSpc>
+                <a:spcPct val="100000"/>
+              </a:lnSpc>
+              <a:spcBef>
+                <a:spcPts val="0"/>
+              </a:spcBef>
+              <a:spcAft>
+                <a:spcPts val="0"/>
+              </a:spcAft>
+              <a:buClrTx/>
+              <a:buSzTx/>
+              <a:buFontTx/>
+              <a:buNone/>
+              <a:tabLst/>
+              <a:defRPr/>
+            </a:pPr>
+            <a:endParaRPr kumimoji="0" lang="en-US" sz="1800" b="0" i="0" u="none" strike="noStrike" kern="1200" cap="none" spc="0" normalizeH="0" baseline="0" noProof="0" dirty="0">
+              <a:ln>
+                <a:noFill/>
+              </a:ln>
+              <a:solidFill>
+                <a:prstClr val="white"/>
+              </a:solidFill>
+              <a:effectLst/>
+              <a:uLnTx/>
+              <a:uFillTx/>
+              <a:latin typeface="Montserrat"/>
+              <a:ea typeface="+mn-ea"/>
+              <a:cs typeface="+mn-cs"/>
+            </a:endParaRPr>
+          </a:p>
+        </p:txBody>
+      </p:sp>
+      <p:sp>
+        <p:nvSpPr>
+          <p:cNvPr id="12" name="Oval 11">
+            <a:extLst>
+              <a:ext uri="{FF2B5EF4-FFF2-40B4-BE49-F238E27FC236}">
+                <a16:creationId xmlns:a16="http://schemas.microsoft.com/office/drawing/2014/main" id="{6F762BF8-9D33-4F22-8C8B-794D95486038}"/>
+              </a:ext>
+            </a:extLst>
+          </p:cNvPr>
+          <p:cNvSpPr/>
+          <p:nvPr/>
+        </p:nvSpPr>
+        <p:spPr>
+          <a:xfrm>
+            <a:off x="11206956" y="5933756"/>
+            <a:ext cx="262560" cy="262560"/>
+          </a:xfrm>
+          <a:prstGeom prst="ellipse">
+            <a:avLst/>
+          </a:prstGeom>
+          <a:solidFill>
+            <a:schemeClr val="bg1"/>
+          </a:solidFill>
+          <a:ln>
+            <a:noFill/>
+          </a:ln>
+        </p:spPr>
+        <p:style>
+          <a:lnRef idx="2">
+            <a:schemeClr val="accent1">
+              <a:shade val="50000"/>
+            </a:schemeClr>
+          </a:lnRef>
+          <a:fillRef idx="1">
+            <a:schemeClr val="accent1"/>
+          </a:fillRef>
+          <a:effectRef idx="0">
+            <a:schemeClr val="accent1"/>
+          </a:effectRef>
+          <a:fontRef idx="minor">
+            <a:schemeClr val="lt1"/>
+          </a:fontRef>
+        </p:style>
+        <p:txBody>
+          <a:bodyPr rtlCol="0" anchor="ctr"/>
+          <a:lstStyle/>
+          <a:p>
+            <a:pPr marL="0" marR="0" lvl="0" indent="0" algn="ctr" defTabSz="914400" rtl="0" eaLnBrk="1" fontAlgn="auto" latinLnBrk="0" hangingPunct="1">
+              <a:lnSpc>
+                <a:spcPct val="100000"/>
+              </a:lnSpc>
+              <a:spcBef>
+                <a:spcPts val="0"/>
+              </a:spcBef>
+              <a:spcAft>
+                <a:spcPts val="0"/>
+              </a:spcAft>
+              <a:buClrTx/>
+              <a:buSzTx/>
+              <a:buFontTx/>
+              <a:buNone/>
+              <a:tabLst/>
+              <a:defRPr/>
+            </a:pPr>
+            <a:endParaRPr kumimoji="0" lang="en-US" sz="1800" b="0" i="0" u="none" strike="noStrike" kern="1200" cap="none" spc="0" normalizeH="0" baseline="0" noProof="0" dirty="0">
+              <a:ln>
+                <a:noFill/>
+              </a:ln>
+              <a:solidFill>
+                <a:prstClr val="white"/>
+              </a:solidFill>
+              <a:effectLst/>
+              <a:uLnTx/>
+              <a:uFillTx/>
+              <a:latin typeface="Montserrat"/>
+              <a:ea typeface="+mn-ea"/>
+              <a:cs typeface="+mn-cs"/>
+            </a:endParaRPr>
+          </a:p>
+        </p:txBody>
+      </p:sp>
+      <p:sp>
+        <p:nvSpPr>
+          <p:cNvPr id="13" name="Oval 12">
+            <a:extLst>
+              <a:ext uri="{FF2B5EF4-FFF2-40B4-BE49-F238E27FC236}">
+                <a16:creationId xmlns:a16="http://schemas.microsoft.com/office/drawing/2014/main" id="{5338BC99-AC7D-49D4-B253-9BECC4D02BD7}"/>
+              </a:ext>
+            </a:extLst>
+          </p:cNvPr>
+          <p:cNvSpPr/>
+          <p:nvPr/>
+        </p:nvSpPr>
+        <p:spPr>
+          <a:xfrm>
+            <a:off x="9896676" y="804464"/>
+            <a:ext cx="262560" cy="262560"/>
+          </a:xfrm>
+          <a:prstGeom prst="ellipse">
+            <a:avLst/>
+          </a:prstGeom>
+          <a:solidFill>
+            <a:schemeClr val="bg1"/>
+          </a:solidFill>
+          <a:ln>
+            <a:noFill/>
+          </a:ln>
+        </p:spPr>
+        <p:style>
+          <a:lnRef idx="2">
+            <a:schemeClr val="accent1">
+              <a:shade val="50000"/>
+            </a:schemeClr>
+          </a:lnRef>
+          <a:fillRef idx="1">
+            <a:schemeClr val="accent1"/>
+          </a:fillRef>
+          <a:effectRef idx="0">
+            <a:schemeClr val="accent1"/>
+          </a:effectRef>
+          <a:fontRef idx="minor">
+            <a:schemeClr val="lt1"/>
+          </a:fontRef>
+        </p:style>
+        <p:txBody>
+          <a:bodyPr rtlCol="0" anchor="ctr"/>
+          <a:lstStyle/>
+          <a:p>
+            <a:pPr marL="0" marR="0" lvl="0" indent="0" algn="ctr" defTabSz="914400" rtl="0" eaLnBrk="1" fontAlgn="auto" latinLnBrk="0" hangingPunct="1">
+              <a:lnSpc>
+                <a:spcPct val="100000"/>
+              </a:lnSpc>
+              <a:spcBef>
+                <a:spcPts val="0"/>
+              </a:spcBef>
+              <a:spcAft>
+                <a:spcPts val="0"/>
+              </a:spcAft>
+              <a:buClrTx/>
+              <a:buSzTx/>
+              <a:buFontTx/>
+              <a:buNone/>
+              <a:tabLst/>
+              <a:defRPr/>
+            </a:pPr>
+            <a:endParaRPr kumimoji="0" lang="en-US" sz="1800" b="0" i="0" u="none" strike="noStrike" kern="1200" cap="none" spc="0" normalizeH="0" baseline="0" noProof="0" dirty="0">
+              <a:ln>
+                <a:noFill/>
+              </a:ln>
+              <a:solidFill>
+                <a:prstClr val="white"/>
+              </a:solidFill>
+              <a:effectLst/>
+              <a:uLnTx/>
+              <a:uFillTx/>
+              <a:latin typeface="Montserrat"/>
+              <a:ea typeface="+mn-ea"/>
+              <a:cs typeface="+mn-cs"/>
+            </a:endParaRPr>
+          </a:p>
+        </p:txBody>
+      </p:sp>
+      <p:sp>
+        <p:nvSpPr>
+          <p:cNvPr id="14" name="Freeform: Shape 13">
+            <a:extLst>
+              <a:ext uri="{FF2B5EF4-FFF2-40B4-BE49-F238E27FC236}">
+                <a16:creationId xmlns:a16="http://schemas.microsoft.com/office/drawing/2014/main" id="{A685EDDA-22C7-44D4-9D0C-9FC0D2D7D692}"/>
+              </a:ext>
+            </a:extLst>
+          </p:cNvPr>
+          <p:cNvSpPr/>
+          <p:nvPr/>
+        </p:nvSpPr>
+        <p:spPr>
+          <a:xfrm>
+            <a:off x="12056564" y="5480994"/>
+            <a:ext cx="131280" cy="262560"/>
+          </a:xfrm>
+          <a:custGeom>
+            <a:avLst/>
+            <a:gdLst>
+              <a:gd name="connsiteX0" fmla="*/ 131280 w 131280"/>
+              <a:gd name="connsiteY0" fmla="*/ 0 h 262560"/>
+              <a:gd name="connsiteX1" fmla="*/ 131280 w 131280"/>
+              <a:gd name="connsiteY1" fmla="*/ 262560 h 262560"/>
+              <a:gd name="connsiteX2" fmla="*/ 0 w 131280"/>
+              <a:gd name="connsiteY2" fmla="*/ 131280 h 262560"/>
+              <a:gd name="connsiteX3" fmla="*/ 131280 w 131280"/>
+              <a:gd name="connsiteY3" fmla="*/ 0 h 262560"/>
+            </a:gdLst>
+            <a:ahLst/>
+            <a:cxnLst>
+              <a:cxn ang="0">
+                <a:pos x="connsiteX0" y="connsiteY0"/>
+              </a:cxn>
+              <a:cxn ang="0">
+                <a:pos x="connsiteX1" y="connsiteY1"/>
+              </a:cxn>
+              <a:cxn ang="0">
+                <a:pos x="connsiteX2" y="connsiteY2"/>
+              </a:cxn>
+              <a:cxn ang="0">
+                <a:pos x="connsiteX3" y="connsiteY3"/>
+              </a:cxn>
+            </a:cxnLst>
+            <a:rect l="l" t="t" r="r" b="b"/>
+            <a:pathLst>
+              <a:path w="131280" h="262560">
+                <a:moveTo>
+                  <a:pt x="131280" y="0"/>
+                </a:moveTo>
+                <a:lnTo>
+                  <a:pt x="131280" y="262560"/>
+                </a:lnTo>
+                <a:cubicBezTo>
+                  <a:pt x="58776" y="262560"/>
+                  <a:pt x="0" y="203784"/>
+                  <a:pt x="0" y="131280"/>
+                </a:cubicBezTo>
+                <a:cubicBezTo>
+                  <a:pt x="0" y="58776"/>
+                  <a:pt x="58776" y="0"/>
+                  <a:pt x="131280" y="0"/>
+                </a:cubicBezTo>
+                <a:close/>
+              </a:path>
+            </a:pathLst>
+          </a:custGeom>
+          <a:solidFill>
+            <a:schemeClr val="bg2">
+              <a:lumMod val="25000"/>
+            </a:schemeClr>
+          </a:solidFill>
+          <a:ln>
+            <a:noFill/>
+          </a:ln>
+        </p:spPr>
+        <p:style>
+          <a:lnRef idx="2">
+            <a:schemeClr val="accent1">
+              <a:shade val="50000"/>
+            </a:schemeClr>
+          </a:lnRef>
+          <a:fillRef idx="1">
+            <a:schemeClr val="accent1"/>
+          </a:fillRef>
+          <a:effectRef idx="0">
+            <a:schemeClr val="accent1"/>
+          </a:effectRef>
+          <a:fontRef idx="minor">
+            <a:schemeClr val="lt1"/>
+          </a:fontRef>
+        </p:style>
+        <p:txBody>
+          <a:bodyPr wrap="square" rtlCol="0" anchor="ctr">
+            <a:noAutofit/>
+          </a:bodyPr>
+          <a:lstStyle/>
+          <a:p>
+            <a:pPr marL="0" marR="0" lvl="0" indent="0" algn="ctr" defTabSz="914400" rtl="0" eaLnBrk="1" fontAlgn="auto" latinLnBrk="0" hangingPunct="1">
+              <a:lnSpc>
+                <a:spcPct val="100000"/>
+              </a:lnSpc>
+              <a:spcBef>
+                <a:spcPts val="0"/>
+              </a:spcBef>
+              <a:spcAft>
+                <a:spcPts val="0"/>
+              </a:spcAft>
+              <a:buClrTx/>
+              <a:buSzTx/>
+              <a:buFontTx/>
+              <a:buNone/>
+              <a:tabLst/>
+              <a:defRPr/>
+            </a:pPr>
+            <a:endParaRPr kumimoji="0" lang="en-US" sz="1800" b="0" i="0" u="none" strike="noStrike" kern="1200" cap="none" spc="0" normalizeH="0" baseline="0" noProof="0" dirty="0">
+              <a:ln>
+                <a:noFill/>
+              </a:ln>
+              <a:solidFill>
+                <a:prstClr val="white"/>
+              </a:solidFill>
+              <a:effectLst/>
+              <a:uLnTx/>
+              <a:uFillTx/>
+              <a:latin typeface="Montserrat"/>
+              <a:ea typeface="+mn-ea"/>
+              <a:cs typeface="+mn-cs"/>
+            </a:endParaRPr>
+          </a:p>
+        </p:txBody>
+      </p:sp>
+      <p:sp>
+        <p:nvSpPr>
+          <p:cNvPr id="15" name="Freeform: Shape 14">
+            <a:extLst>
+              <a:ext uri="{FF2B5EF4-FFF2-40B4-BE49-F238E27FC236}">
+                <a16:creationId xmlns:a16="http://schemas.microsoft.com/office/drawing/2014/main" id="{BA9721E0-EABB-414E-915A-D5E788EA85AB}"/>
+              </a:ext>
+            </a:extLst>
+          </p:cNvPr>
+          <p:cNvSpPr/>
+          <p:nvPr/>
+        </p:nvSpPr>
+        <p:spPr>
+          <a:xfrm>
+            <a:off x="12066089" y="1139742"/>
+            <a:ext cx="131280" cy="262560"/>
+          </a:xfrm>
+          <a:custGeom>
+            <a:avLst/>
+            <a:gdLst>
+              <a:gd name="connsiteX0" fmla="*/ 131280 w 131280"/>
+              <a:gd name="connsiteY0" fmla="*/ 0 h 262560"/>
+              <a:gd name="connsiteX1" fmla="*/ 131280 w 131280"/>
+              <a:gd name="connsiteY1" fmla="*/ 262560 h 262560"/>
+              <a:gd name="connsiteX2" fmla="*/ 0 w 131280"/>
+              <a:gd name="connsiteY2" fmla="*/ 131280 h 262560"/>
+              <a:gd name="connsiteX3" fmla="*/ 131280 w 131280"/>
+              <a:gd name="connsiteY3" fmla="*/ 0 h 262560"/>
+            </a:gdLst>
+            <a:ahLst/>
+            <a:cxnLst>
+              <a:cxn ang="0">
+                <a:pos x="connsiteX0" y="connsiteY0"/>
+              </a:cxn>
+              <a:cxn ang="0">
+                <a:pos x="connsiteX1" y="connsiteY1"/>
+              </a:cxn>
+              <a:cxn ang="0">
+                <a:pos x="connsiteX2" y="connsiteY2"/>
+              </a:cxn>
+              <a:cxn ang="0">
+                <a:pos x="connsiteX3" y="connsiteY3"/>
+              </a:cxn>
+            </a:cxnLst>
+            <a:rect l="l" t="t" r="r" b="b"/>
+            <a:pathLst>
+              <a:path w="131280" h="262560">
+                <a:moveTo>
+                  <a:pt x="131280" y="0"/>
+                </a:moveTo>
+                <a:lnTo>
+                  <a:pt x="131280" y="262560"/>
+                </a:lnTo>
+                <a:cubicBezTo>
+                  <a:pt x="58776" y="262560"/>
+                  <a:pt x="0" y="203784"/>
+                  <a:pt x="0" y="131280"/>
+                </a:cubicBezTo>
+                <a:cubicBezTo>
+                  <a:pt x="0" y="58776"/>
+                  <a:pt x="58776" y="0"/>
+                  <a:pt x="131280" y="0"/>
+                </a:cubicBezTo>
+                <a:close/>
+              </a:path>
+            </a:pathLst>
+          </a:custGeom>
+          <a:solidFill>
+            <a:schemeClr val="bg1"/>
+          </a:solidFill>
+          <a:ln>
+            <a:noFill/>
+          </a:ln>
+        </p:spPr>
+        <p:style>
+          <a:lnRef idx="2">
+            <a:schemeClr val="accent1">
+              <a:shade val="50000"/>
+            </a:schemeClr>
+          </a:lnRef>
+          <a:fillRef idx="1">
+            <a:schemeClr val="accent1"/>
+          </a:fillRef>
+          <a:effectRef idx="0">
+            <a:schemeClr val="accent1"/>
+          </a:effectRef>
+          <a:fontRef idx="minor">
+            <a:schemeClr val="lt1"/>
+          </a:fontRef>
+        </p:style>
+        <p:txBody>
+          <a:bodyPr wrap="square" rtlCol="0" anchor="ctr">
+            <a:noAutofit/>
+          </a:bodyPr>
+          <a:lstStyle/>
+          <a:p>
+            <a:pPr marL="0" marR="0" lvl="0" indent="0" algn="ctr" defTabSz="914400" rtl="0" eaLnBrk="1" fontAlgn="auto" latinLnBrk="0" hangingPunct="1">
+              <a:lnSpc>
+                <a:spcPct val="100000"/>
+              </a:lnSpc>
+              <a:spcBef>
+                <a:spcPts val="0"/>
+              </a:spcBef>
+              <a:spcAft>
+                <a:spcPts val="0"/>
+              </a:spcAft>
+              <a:buClrTx/>
+              <a:buSzTx/>
+              <a:buFontTx/>
+              <a:buNone/>
+              <a:tabLst/>
+              <a:defRPr/>
+            </a:pPr>
+            <a:endParaRPr kumimoji="0" lang="en-US" sz="1800" b="0" i="0" u="none" strike="noStrike" kern="1200" cap="none" spc="0" normalizeH="0" baseline="0" noProof="0" dirty="0">
+              <a:ln>
+                <a:noFill/>
+              </a:ln>
+              <a:solidFill>
+                <a:prstClr val="white"/>
+              </a:solidFill>
+              <a:effectLst/>
+              <a:uLnTx/>
+              <a:uFillTx/>
+              <a:latin typeface="Montserrat"/>
+              <a:ea typeface="+mn-ea"/>
+              <a:cs typeface="+mn-cs"/>
+            </a:endParaRPr>
+          </a:p>
+        </p:txBody>
+      </p:sp>
+      <p:sp>
+        <p:nvSpPr>
+          <p:cNvPr id="16" name="Freeform: Shape 15">
+            <a:extLst>
+              <a:ext uri="{FF2B5EF4-FFF2-40B4-BE49-F238E27FC236}">
+                <a16:creationId xmlns:a16="http://schemas.microsoft.com/office/drawing/2014/main" id="{2450B8BF-3AF3-4F9E-BF8D-2F89F9BBE510}"/>
+              </a:ext>
+            </a:extLst>
+          </p:cNvPr>
+          <p:cNvSpPr/>
+          <p:nvPr/>
+        </p:nvSpPr>
+        <p:spPr>
+          <a:xfrm rot="5400000">
+            <a:off x="6233560" y="6661080"/>
+            <a:ext cx="131280" cy="262560"/>
+          </a:xfrm>
+          <a:custGeom>
+            <a:avLst/>
+            <a:gdLst>
+              <a:gd name="connsiteX0" fmla="*/ 131280 w 131280"/>
+              <a:gd name="connsiteY0" fmla="*/ 0 h 262560"/>
+              <a:gd name="connsiteX1" fmla="*/ 131280 w 131280"/>
+              <a:gd name="connsiteY1" fmla="*/ 262560 h 262560"/>
+              <a:gd name="connsiteX2" fmla="*/ 0 w 131280"/>
+              <a:gd name="connsiteY2" fmla="*/ 131280 h 262560"/>
+              <a:gd name="connsiteX3" fmla="*/ 131280 w 131280"/>
+              <a:gd name="connsiteY3" fmla="*/ 0 h 262560"/>
+            </a:gdLst>
+            <a:ahLst/>
+            <a:cxnLst>
+              <a:cxn ang="0">
+                <a:pos x="connsiteX0" y="connsiteY0"/>
+              </a:cxn>
+              <a:cxn ang="0">
+                <a:pos x="connsiteX1" y="connsiteY1"/>
+              </a:cxn>
+              <a:cxn ang="0">
+                <a:pos x="connsiteX2" y="connsiteY2"/>
+              </a:cxn>
+              <a:cxn ang="0">
+                <a:pos x="connsiteX3" y="connsiteY3"/>
+              </a:cxn>
+            </a:cxnLst>
+            <a:rect l="l" t="t" r="r" b="b"/>
+            <a:pathLst>
+              <a:path w="131280" h="262560">
+                <a:moveTo>
+                  <a:pt x="131280" y="0"/>
+                </a:moveTo>
+                <a:lnTo>
+                  <a:pt x="131280" y="262560"/>
+                </a:lnTo>
+                <a:cubicBezTo>
+                  <a:pt x="58776" y="262560"/>
+                  <a:pt x="0" y="203784"/>
+                  <a:pt x="0" y="131280"/>
+                </a:cubicBezTo>
+                <a:cubicBezTo>
+                  <a:pt x="0" y="58776"/>
+                  <a:pt x="58776" y="0"/>
+                  <a:pt x="131280" y="0"/>
+                </a:cubicBezTo>
+                <a:close/>
+              </a:path>
+            </a:pathLst>
+          </a:custGeom>
+          <a:solidFill>
+            <a:schemeClr val="bg2">
+              <a:lumMod val="25000"/>
+            </a:schemeClr>
+          </a:solidFill>
+          <a:ln>
+            <a:noFill/>
+          </a:ln>
+        </p:spPr>
+        <p:style>
+          <a:lnRef idx="2">
+            <a:schemeClr val="accent1">
+              <a:shade val="50000"/>
+            </a:schemeClr>
+          </a:lnRef>
+          <a:fillRef idx="1">
+            <a:schemeClr val="accent1"/>
+          </a:fillRef>
+          <a:effectRef idx="0">
+            <a:schemeClr val="accent1"/>
+          </a:effectRef>
+          <a:fontRef idx="minor">
+            <a:schemeClr val="lt1"/>
+          </a:fontRef>
+        </p:style>
+        <p:txBody>
+          <a:bodyPr wrap="square" rtlCol="0" anchor="ctr">
+            <a:noAutofit/>
+          </a:bodyPr>
+          <a:lstStyle/>
+          <a:p>
+            <a:pPr marL="0" marR="0" lvl="0" indent="0" algn="ctr" defTabSz="914400" rtl="0" eaLnBrk="1" fontAlgn="auto" latinLnBrk="0" hangingPunct="1">
+              <a:lnSpc>
+                <a:spcPct val="100000"/>
+              </a:lnSpc>
+              <a:spcBef>
+                <a:spcPts val="0"/>
+              </a:spcBef>
+              <a:spcAft>
+                <a:spcPts val="0"/>
+              </a:spcAft>
+              <a:buClrTx/>
+              <a:buSzTx/>
+              <a:buFontTx/>
+              <a:buNone/>
+              <a:tabLst/>
+              <a:defRPr/>
+            </a:pPr>
+            <a:endParaRPr kumimoji="0" lang="en-US" sz="1800" b="0" i="0" u="none" strike="noStrike" kern="1200" cap="none" spc="0" normalizeH="0" baseline="0" noProof="0" dirty="0">
+              <a:ln>
+                <a:noFill/>
+              </a:ln>
+              <a:solidFill>
+                <a:prstClr val="white"/>
+              </a:solidFill>
+              <a:effectLst/>
+              <a:uLnTx/>
+              <a:uFillTx/>
+              <a:latin typeface="Montserrat"/>
+              <a:ea typeface="+mn-ea"/>
+              <a:cs typeface="+mn-cs"/>
+            </a:endParaRPr>
+          </a:p>
+        </p:txBody>
+      </p:sp>
+      <p:sp>
+        <p:nvSpPr>
+          <p:cNvPr id="55" name="TextBox 54">
+            <a:extLst>
+              <a:ext uri="{FF2B5EF4-FFF2-40B4-BE49-F238E27FC236}">
+                <a16:creationId xmlns:a16="http://schemas.microsoft.com/office/drawing/2014/main" id="{E293866C-A9ED-43DE-807A-A9F13875F9F5}"/>
+              </a:ext>
+            </a:extLst>
+          </p:cNvPr>
+          <p:cNvSpPr txBox="1"/>
+          <p:nvPr/>
+        </p:nvSpPr>
+        <p:spPr>
+          <a:xfrm>
+            <a:off x="2164044" y="131279"/>
+            <a:ext cx="8126062" cy="830997"/>
+          </a:xfrm>
+          <a:prstGeom prst="rect">
+            <a:avLst/>
+          </a:prstGeom>
+          <a:noFill/>
+        </p:spPr>
+        <p:txBody>
+          <a:bodyPr wrap="square" rtlCol="0">
+            <a:spAutoFit/>
+          </a:bodyPr>
+          <a:lstStyle/>
+          <a:p>
+            <a:pPr marL="0" marR="0" lvl="0" indent="0" algn="ctr" defTabSz="914400" rtl="0" eaLnBrk="1" fontAlgn="auto" latinLnBrk="0" hangingPunct="1">
+              <a:lnSpc>
+                <a:spcPct val="100000"/>
+              </a:lnSpc>
+              <a:spcBef>
+                <a:spcPts val="0"/>
+              </a:spcBef>
+              <a:spcAft>
+                <a:spcPts val="0"/>
+              </a:spcAft>
+              <a:buClrTx/>
+              <a:buSzTx/>
+              <a:buFontTx/>
+              <a:buNone/>
+              <a:tabLst/>
+              <a:defRPr/>
+            </a:pPr>
+            <a:r>
+              <a:rPr kumimoji="0" lang="en-US" sz="4800" b="1" i="0" u="none" strike="noStrike" kern="1200" cap="none" spc="0" normalizeH="0" baseline="0" noProof="0" dirty="0">
+                <a:ln>
+                  <a:solidFill>
+                    <a:schemeClr val="bg2">
+                      <a:lumMod val="50000"/>
+                    </a:schemeClr>
+                  </a:solidFill>
+                </a:ln>
+                <a:solidFill>
+                  <a:prstClr val="white">
+                    <a:lumMod val="95000"/>
+                  </a:prstClr>
+                </a:solidFill>
+                <a:effectLst/>
+                <a:uLnTx/>
+                <a:uFillTx/>
+                <a:latin typeface="Tw Cen MT" panose="020B0602020104020603" pitchFamily="34" charset="0"/>
+                <a:ea typeface="+mn-ea"/>
+                <a:cs typeface="+mn-cs"/>
+              </a:rPr>
+              <a:t>Quality Assurance</a:t>
+            </a:r>
+          </a:p>
+        </p:txBody>
+      </p:sp>
+      <p:pic>
+        <p:nvPicPr>
+          <p:cNvPr id="18" name="Picture 17">
+            <a:extLst>
+              <a:ext uri="{FF2B5EF4-FFF2-40B4-BE49-F238E27FC236}">
+                <a16:creationId xmlns:a16="http://schemas.microsoft.com/office/drawing/2014/main" id="{769BD99E-ED02-7BEF-4E49-81DCDA9F72F9}"/>
+              </a:ext>
+            </a:extLst>
+          </p:cNvPr>
+          <p:cNvPicPr>
+            <a:picLocks noChangeAspect="1"/>
+          </p:cNvPicPr>
+          <p:nvPr/>
+        </p:nvPicPr>
+        <p:blipFill>
+          <a:blip r:embed="rId2"/>
+          <a:stretch>
+            <a:fillRect/>
+          </a:stretch>
+        </p:blipFill>
+        <p:spPr>
+          <a:xfrm>
+            <a:off x="769874" y="3986797"/>
+            <a:ext cx="262151" cy="268247"/>
+          </a:xfrm>
+          <a:prstGeom prst="rect">
+            <a:avLst/>
+          </a:prstGeom>
+        </p:spPr>
+      </p:pic>
+      <p:pic>
+        <p:nvPicPr>
+          <p:cNvPr id="19" name="Picture 18">
+            <a:extLst>
+              <a:ext uri="{FF2B5EF4-FFF2-40B4-BE49-F238E27FC236}">
+                <a16:creationId xmlns:a16="http://schemas.microsoft.com/office/drawing/2014/main" id="{192B6CDB-EE5C-C43F-F439-D844EDC58453}"/>
+              </a:ext>
+            </a:extLst>
+          </p:cNvPr>
+          <p:cNvPicPr>
+            <a:picLocks noChangeAspect="1"/>
+          </p:cNvPicPr>
+          <p:nvPr/>
+        </p:nvPicPr>
+        <p:blipFill>
+          <a:blip r:embed="rId3"/>
+          <a:stretch>
+            <a:fillRect/>
+          </a:stretch>
+        </p:blipFill>
+        <p:spPr>
+          <a:xfrm>
+            <a:off x="1645130" y="5514280"/>
+            <a:ext cx="158510" cy="158510"/>
+          </a:xfrm>
+          <a:prstGeom prst="rect">
+            <a:avLst/>
+          </a:prstGeom>
+        </p:spPr>
+      </p:pic>
+      <p:sp>
+        <p:nvSpPr>
+          <p:cNvPr id="17" name="TextBox 16">
+            <a:extLst>
+              <a:ext uri="{FF2B5EF4-FFF2-40B4-BE49-F238E27FC236}">
+                <a16:creationId xmlns:a16="http://schemas.microsoft.com/office/drawing/2014/main" id="{55CBF261-CB5F-5F18-DB07-D4E0CF9A7D72}"/>
+              </a:ext>
+            </a:extLst>
+          </p:cNvPr>
+          <p:cNvSpPr txBox="1"/>
+          <p:nvPr/>
+        </p:nvSpPr>
+        <p:spPr>
+          <a:xfrm>
+            <a:off x="2164044" y="1428807"/>
+            <a:ext cx="7040710" cy="4247317"/>
+          </a:xfrm>
+          <a:prstGeom prst="rect">
+            <a:avLst/>
+          </a:prstGeom>
+          <a:noFill/>
+        </p:spPr>
+        <p:txBody>
+          <a:bodyPr wrap="none" rtlCol="0">
+            <a:spAutoFit/>
+          </a:bodyPr>
+          <a:lstStyle/>
+          <a:p>
+            <a:pPr marL="285750" marR="0" lvl="0" indent="-285750" algn="l" defTabSz="914400" rtl="0" eaLnBrk="1" fontAlgn="auto" latinLnBrk="0" hangingPunct="1">
+              <a:lnSpc>
+                <a:spcPct val="100000"/>
+              </a:lnSpc>
+              <a:spcBef>
+                <a:spcPts val="0"/>
+              </a:spcBef>
+              <a:spcAft>
+                <a:spcPts val="0"/>
+              </a:spcAft>
+              <a:buClrTx/>
+              <a:buSzTx/>
+              <a:buFont typeface="Wingdings" panose="05000000000000000000" pitchFamily="2" charset="2"/>
+              <a:buChar char="Ø"/>
+              <a:tabLst/>
+              <a:defRPr/>
+            </a:pPr>
+            <a:r>
+              <a:rPr kumimoji="0" lang="en-ZA" sz="1800" b="0" i="0" u="none" strike="noStrike" kern="1200" cap="none" spc="0" normalizeH="0" baseline="0" noProof="0" dirty="0">
+                <a:ln>
+                  <a:noFill/>
+                </a:ln>
+                <a:solidFill>
+                  <a:prstClr val="white"/>
+                </a:solidFill>
+                <a:effectLst/>
+                <a:uLnTx/>
+                <a:uFillTx/>
+                <a:latin typeface="Montserrat"/>
+                <a:ea typeface="+mn-ea"/>
+                <a:cs typeface="+mn-cs"/>
+              </a:rPr>
+              <a:t>Security</a:t>
+            </a:r>
+          </a:p>
+          <a:p>
+            <a:pPr marL="742950" marR="0" lvl="1" indent="-285750" algn="l" defTabSz="914400" rtl="0" eaLnBrk="1" fontAlgn="auto" latinLnBrk="0" hangingPunct="1">
+              <a:lnSpc>
+                <a:spcPct val="100000"/>
+              </a:lnSpc>
+              <a:spcBef>
+                <a:spcPts val="0"/>
+              </a:spcBef>
+              <a:spcAft>
+                <a:spcPts val="0"/>
+              </a:spcAft>
+              <a:buClrTx/>
+              <a:buSzTx/>
+              <a:buFont typeface="Arial" panose="020B0604020202020204" pitchFamily="34" charset="0"/>
+              <a:buChar char="•"/>
+              <a:tabLst/>
+              <a:defRPr/>
+            </a:pPr>
+            <a:r>
+              <a:rPr kumimoji="0" lang="en-ZA" sz="1800" b="0" i="0" u="none" strike="noStrike" kern="1200" cap="none" spc="0" normalizeH="0" baseline="0" noProof="0" dirty="0">
+                <a:ln>
+                  <a:noFill/>
+                </a:ln>
+                <a:solidFill>
+                  <a:prstClr val="white"/>
+                </a:solidFill>
+                <a:effectLst/>
+                <a:uLnTx/>
+                <a:uFillTx/>
+                <a:latin typeface="Montserrat"/>
+                <a:ea typeface="+mn-ea"/>
+                <a:cs typeface="+mn-cs"/>
+              </a:rPr>
+              <a:t>Encryption in transit (HTTPS) and at rest</a:t>
+            </a:r>
+          </a:p>
+          <a:p>
+            <a:pPr marL="742950" marR="0" lvl="1" indent="-285750" algn="l" defTabSz="914400" rtl="0" eaLnBrk="1" fontAlgn="auto" latinLnBrk="0" hangingPunct="1">
+              <a:lnSpc>
+                <a:spcPct val="100000"/>
+              </a:lnSpc>
+              <a:spcBef>
+                <a:spcPts val="0"/>
+              </a:spcBef>
+              <a:spcAft>
+                <a:spcPts val="0"/>
+              </a:spcAft>
+              <a:buClrTx/>
+              <a:buSzTx/>
+              <a:buFont typeface="Arial" panose="020B0604020202020204" pitchFamily="34" charset="0"/>
+              <a:buChar char="•"/>
+              <a:tabLst/>
+              <a:defRPr/>
+            </a:pPr>
+            <a:r>
+              <a:rPr kumimoji="0" lang="en-ZA" sz="1800" b="0" i="0" u="none" strike="noStrike" kern="1200" cap="none" spc="0" normalizeH="0" baseline="0" noProof="0" dirty="0">
+                <a:ln>
+                  <a:noFill/>
+                </a:ln>
+                <a:solidFill>
+                  <a:prstClr val="white"/>
+                </a:solidFill>
+                <a:effectLst/>
+                <a:uLnTx/>
+                <a:uFillTx/>
+                <a:latin typeface="Montserrat"/>
+                <a:ea typeface="+mn-ea"/>
+                <a:cs typeface="+mn-cs"/>
+              </a:rPr>
+              <a:t>Role Based Access with protected routes</a:t>
+            </a:r>
+          </a:p>
+          <a:p>
+            <a:pPr marL="742950" marR="0" lvl="1" indent="-285750" algn="l" defTabSz="914400" rtl="0" eaLnBrk="1" fontAlgn="auto" latinLnBrk="0" hangingPunct="1">
+              <a:lnSpc>
+                <a:spcPct val="100000"/>
+              </a:lnSpc>
+              <a:spcBef>
+                <a:spcPts val="0"/>
+              </a:spcBef>
+              <a:spcAft>
+                <a:spcPts val="0"/>
+              </a:spcAft>
+              <a:buClrTx/>
+              <a:buSzTx/>
+              <a:buFont typeface="Arial" panose="020B0604020202020204" pitchFamily="34" charset="0"/>
+              <a:buChar char="•"/>
+              <a:tabLst/>
+              <a:defRPr/>
+            </a:pPr>
+            <a:r>
+              <a:rPr lang="en-ZA" dirty="0">
+                <a:solidFill>
+                  <a:prstClr val="white"/>
+                </a:solidFill>
+                <a:latin typeface="Montserrat"/>
+              </a:rPr>
+              <a:t>Injection and XSS prevention</a:t>
+            </a:r>
+            <a:endParaRPr kumimoji="0" lang="en-ZA" sz="1800" b="0" i="0" u="none" strike="noStrike" kern="1200" cap="none" spc="0" normalizeH="0" baseline="0" noProof="0" dirty="0">
+              <a:ln>
+                <a:noFill/>
+              </a:ln>
+              <a:solidFill>
+                <a:prstClr val="white"/>
+              </a:solidFill>
+              <a:effectLst/>
+              <a:uLnTx/>
+              <a:uFillTx/>
+              <a:latin typeface="Montserrat"/>
+              <a:ea typeface="+mn-ea"/>
+              <a:cs typeface="+mn-cs"/>
+            </a:endParaRPr>
+          </a:p>
+          <a:p>
+            <a:pPr marL="742950" marR="0" lvl="1" indent="-285750" algn="l" defTabSz="914400" rtl="0" eaLnBrk="1" fontAlgn="auto" latinLnBrk="0" hangingPunct="1">
+              <a:lnSpc>
+                <a:spcPct val="100000"/>
+              </a:lnSpc>
+              <a:spcBef>
+                <a:spcPts val="0"/>
+              </a:spcBef>
+              <a:spcAft>
+                <a:spcPts val="0"/>
+              </a:spcAft>
+              <a:buClrTx/>
+              <a:buSzTx/>
+              <a:buFont typeface="Arial" panose="020B0604020202020204" pitchFamily="34" charset="0"/>
+              <a:buChar char="•"/>
+              <a:tabLst/>
+              <a:defRPr/>
+            </a:pPr>
+            <a:r>
+              <a:rPr kumimoji="0" lang="en-ZA" sz="1800" b="0" i="0" u="none" strike="noStrike" kern="1200" cap="none" spc="0" normalizeH="0" baseline="0" noProof="0" dirty="0">
+                <a:ln>
+                  <a:noFill/>
+                </a:ln>
+                <a:solidFill>
+                  <a:prstClr val="white"/>
+                </a:solidFill>
+                <a:effectLst/>
+                <a:uLnTx/>
+                <a:uFillTx/>
+                <a:latin typeface="Montserrat"/>
+                <a:ea typeface="+mn-ea"/>
+                <a:cs typeface="+mn-cs"/>
+              </a:rPr>
+              <a:t>JSON </a:t>
+            </a:r>
+            <a:r>
+              <a:rPr lang="en-ZA" dirty="0">
+                <a:solidFill>
+                  <a:prstClr val="white"/>
+                </a:solidFill>
+                <a:latin typeface="Montserrat"/>
+              </a:rPr>
+              <a:t>W</a:t>
+            </a:r>
+            <a:r>
+              <a:rPr kumimoji="0" lang="en-ZA" sz="1800" b="0" i="0" u="none" strike="noStrike" kern="1200" cap="none" spc="0" normalizeH="0" baseline="0" noProof="0" dirty="0" err="1">
+                <a:ln>
+                  <a:noFill/>
+                </a:ln>
+                <a:solidFill>
+                  <a:prstClr val="white"/>
+                </a:solidFill>
+                <a:effectLst/>
+                <a:uLnTx/>
+                <a:uFillTx/>
+                <a:latin typeface="Montserrat"/>
+                <a:ea typeface="+mn-ea"/>
+                <a:cs typeface="+mn-cs"/>
+              </a:rPr>
+              <a:t>eb</a:t>
+            </a:r>
+            <a:r>
+              <a:rPr kumimoji="0" lang="en-ZA" sz="1800" b="0" i="0" u="none" strike="noStrike" kern="1200" cap="none" spc="0" normalizeH="0" baseline="0" noProof="0" dirty="0">
+                <a:ln>
+                  <a:noFill/>
+                </a:ln>
+                <a:solidFill>
+                  <a:prstClr val="white"/>
+                </a:solidFill>
+                <a:effectLst/>
+                <a:uLnTx/>
+                <a:uFillTx/>
+                <a:latin typeface="Montserrat"/>
+                <a:ea typeface="+mn-ea"/>
+                <a:cs typeface="+mn-cs"/>
+              </a:rPr>
+              <a:t> Tokens </a:t>
+            </a:r>
+          </a:p>
+          <a:p>
+            <a:pPr marL="742950" marR="0" lvl="1" indent="-285750" algn="l" defTabSz="914400" rtl="0" eaLnBrk="1" fontAlgn="auto" latinLnBrk="0" hangingPunct="1">
+              <a:lnSpc>
+                <a:spcPct val="100000"/>
+              </a:lnSpc>
+              <a:spcBef>
+                <a:spcPts val="0"/>
+              </a:spcBef>
+              <a:spcAft>
+                <a:spcPts val="0"/>
+              </a:spcAft>
+              <a:buClrTx/>
+              <a:buSzTx/>
+              <a:buFont typeface="Arial" panose="020B0604020202020204" pitchFamily="34" charset="0"/>
+              <a:buChar char="•"/>
+              <a:tabLst/>
+              <a:defRPr/>
+            </a:pPr>
+            <a:endParaRPr kumimoji="0" lang="en-ZA" sz="1800" b="0" i="0" u="none" strike="noStrike" kern="1200" cap="none" spc="0" normalizeH="0" baseline="0" noProof="0" dirty="0">
+              <a:ln>
+                <a:noFill/>
+              </a:ln>
+              <a:solidFill>
+                <a:prstClr val="white"/>
+              </a:solidFill>
+              <a:effectLst/>
+              <a:uLnTx/>
+              <a:uFillTx/>
+              <a:latin typeface="Montserrat"/>
+              <a:ea typeface="+mn-ea"/>
+              <a:cs typeface="+mn-cs"/>
+            </a:endParaRPr>
+          </a:p>
+          <a:p>
+            <a:pPr marL="285750" marR="0" lvl="0" indent="-285750" algn="l" defTabSz="914400" rtl="0" eaLnBrk="1" fontAlgn="auto" latinLnBrk="0" hangingPunct="1">
+              <a:lnSpc>
+                <a:spcPct val="100000"/>
+              </a:lnSpc>
+              <a:spcBef>
+                <a:spcPts val="0"/>
+              </a:spcBef>
+              <a:spcAft>
+                <a:spcPts val="0"/>
+              </a:spcAft>
+              <a:buClrTx/>
+              <a:buSzTx/>
+              <a:buFont typeface="Wingdings" panose="05000000000000000000" pitchFamily="2" charset="2"/>
+              <a:buChar char="Ø"/>
+              <a:tabLst/>
+              <a:defRPr/>
+            </a:pPr>
+            <a:r>
+              <a:rPr kumimoji="0" lang="en-ZA" sz="1800" b="0" i="0" u="none" strike="noStrike" kern="1200" cap="none" spc="0" normalizeH="0" baseline="0" noProof="0" dirty="0">
+                <a:ln>
+                  <a:noFill/>
+                </a:ln>
+                <a:solidFill>
+                  <a:prstClr val="white"/>
+                </a:solidFill>
+                <a:effectLst/>
+                <a:uLnTx/>
+                <a:uFillTx/>
+                <a:latin typeface="Montserrat"/>
+                <a:ea typeface="+mn-ea"/>
+                <a:cs typeface="+mn-cs"/>
+              </a:rPr>
+              <a:t>Maintainability</a:t>
+            </a:r>
+          </a:p>
+          <a:p>
+            <a:pPr marL="742950" marR="0" lvl="1" indent="-285750" algn="l" defTabSz="914400" rtl="0" eaLnBrk="1" fontAlgn="auto" latinLnBrk="0" hangingPunct="1">
+              <a:lnSpc>
+                <a:spcPct val="100000"/>
+              </a:lnSpc>
+              <a:spcBef>
+                <a:spcPts val="0"/>
+              </a:spcBef>
+              <a:spcAft>
+                <a:spcPts val="0"/>
+              </a:spcAft>
+              <a:buClrTx/>
+              <a:buSzTx/>
+              <a:buFont typeface="Arial" panose="020B0604020202020204" pitchFamily="34" charset="0"/>
+              <a:buChar char="•"/>
+              <a:tabLst/>
+              <a:defRPr/>
+            </a:pPr>
+            <a:r>
+              <a:rPr kumimoji="0" lang="en-ZA" sz="1800" b="0" i="0" u="none" strike="noStrike" kern="1200" cap="none" spc="0" normalizeH="0" baseline="0" noProof="0" dirty="0">
+                <a:ln>
+                  <a:noFill/>
+                </a:ln>
+                <a:solidFill>
+                  <a:prstClr val="white"/>
+                </a:solidFill>
+                <a:effectLst/>
+                <a:uLnTx/>
+                <a:uFillTx/>
+                <a:latin typeface="Montserrat"/>
+                <a:ea typeface="+mn-ea"/>
+                <a:cs typeface="+mn-cs"/>
+              </a:rPr>
+              <a:t>Component based architecture</a:t>
+            </a:r>
+          </a:p>
+          <a:p>
+            <a:pPr marL="742950" marR="0" lvl="1" indent="-285750" algn="l" defTabSz="914400" rtl="0" eaLnBrk="1" fontAlgn="auto" latinLnBrk="0" hangingPunct="1">
+              <a:lnSpc>
+                <a:spcPct val="100000"/>
+              </a:lnSpc>
+              <a:spcBef>
+                <a:spcPts val="0"/>
+              </a:spcBef>
+              <a:spcAft>
+                <a:spcPts val="0"/>
+              </a:spcAft>
+              <a:buClrTx/>
+              <a:buSzTx/>
+              <a:buFont typeface="Arial" panose="020B0604020202020204" pitchFamily="34" charset="0"/>
+              <a:buChar char="•"/>
+              <a:tabLst/>
+              <a:defRPr/>
+            </a:pPr>
+            <a:r>
+              <a:rPr kumimoji="0" lang="en-ZA" sz="1800" b="0" i="0" u="none" strike="noStrike" kern="1200" cap="none" spc="0" normalizeH="0" baseline="0" noProof="0" dirty="0">
+                <a:ln>
+                  <a:noFill/>
+                </a:ln>
+                <a:solidFill>
+                  <a:prstClr val="white"/>
+                </a:solidFill>
+                <a:effectLst/>
+                <a:uLnTx/>
+                <a:uFillTx/>
+                <a:latin typeface="Montserrat"/>
+                <a:ea typeface="+mn-ea"/>
+                <a:cs typeface="+mn-cs"/>
+              </a:rPr>
+              <a:t>Thorough unit tests and code coverage </a:t>
+            </a:r>
+          </a:p>
+          <a:p>
+            <a:pPr marL="742950" marR="0" lvl="1" indent="-285750" algn="l" defTabSz="914400" rtl="0" eaLnBrk="1" fontAlgn="auto" latinLnBrk="0" hangingPunct="1">
+              <a:lnSpc>
+                <a:spcPct val="100000"/>
+              </a:lnSpc>
+              <a:spcBef>
+                <a:spcPts val="0"/>
+              </a:spcBef>
+              <a:spcAft>
+                <a:spcPts val="0"/>
+              </a:spcAft>
+              <a:buClrTx/>
+              <a:buSzTx/>
+              <a:buFont typeface="Arial" panose="020B0604020202020204" pitchFamily="34" charset="0"/>
+              <a:buChar char="•"/>
+              <a:tabLst/>
+              <a:defRPr/>
+            </a:pPr>
+            <a:r>
+              <a:rPr kumimoji="0" lang="en-ZA" sz="1800" b="0" i="0" u="none" strike="noStrike" kern="1200" cap="none" spc="0" normalizeH="0" baseline="0" noProof="0" dirty="0">
+                <a:ln>
+                  <a:noFill/>
+                </a:ln>
+                <a:solidFill>
+                  <a:prstClr val="white"/>
+                </a:solidFill>
+                <a:effectLst/>
+                <a:uLnTx/>
+                <a:uFillTx/>
+                <a:latin typeface="Montserrat"/>
+                <a:ea typeface="+mn-ea"/>
+                <a:cs typeface="+mn-cs"/>
+              </a:rPr>
+              <a:t>Uniform variable naming conventions</a:t>
+            </a:r>
+          </a:p>
+          <a:p>
+            <a:pPr marL="742950" marR="0" lvl="1" indent="-285750" algn="l" defTabSz="914400" rtl="0" eaLnBrk="1" fontAlgn="auto" latinLnBrk="0" hangingPunct="1">
+              <a:lnSpc>
+                <a:spcPct val="100000"/>
+              </a:lnSpc>
+              <a:spcBef>
+                <a:spcPts val="0"/>
+              </a:spcBef>
+              <a:spcAft>
+                <a:spcPts val="0"/>
+              </a:spcAft>
+              <a:buClrTx/>
+              <a:buSzTx/>
+              <a:buFont typeface="Arial" panose="020B0604020202020204" pitchFamily="34" charset="0"/>
+              <a:buChar char="•"/>
+              <a:tabLst/>
+              <a:defRPr/>
+            </a:pPr>
+            <a:endParaRPr kumimoji="0" lang="en-ZA" sz="1800" b="0" i="0" u="none" strike="noStrike" kern="1200" cap="none" spc="0" normalizeH="0" baseline="0" noProof="0" dirty="0">
+              <a:ln>
+                <a:noFill/>
+              </a:ln>
+              <a:solidFill>
+                <a:prstClr val="white"/>
+              </a:solidFill>
+              <a:effectLst/>
+              <a:uLnTx/>
+              <a:uFillTx/>
+              <a:latin typeface="Montserrat"/>
+              <a:ea typeface="+mn-ea"/>
+              <a:cs typeface="+mn-cs"/>
+            </a:endParaRPr>
+          </a:p>
+          <a:p>
+            <a:pPr marL="285750" marR="0" lvl="0" indent="-285750" algn="l" defTabSz="914400" rtl="0" eaLnBrk="1" fontAlgn="auto" latinLnBrk="0" hangingPunct="1">
+              <a:lnSpc>
+                <a:spcPct val="100000"/>
+              </a:lnSpc>
+              <a:spcBef>
+                <a:spcPts val="0"/>
+              </a:spcBef>
+              <a:spcAft>
+                <a:spcPts val="0"/>
+              </a:spcAft>
+              <a:buClrTx/>
+              <a:buSzTx/>
+              <a:buFont typeface="Wingdings" panose="05000000000000000000" pitchFamily="2" charset="2"/>
+              <a:buChar char="Ø"/>
+              <a:tabLst/>
+              <a:defRPr/>
+            </a:pPr>
+            <a:r>
+              <a:rPr kumimoji="0" lang="en-ZA" sz="1800" b="0" i="0" u="none" strike="noStrike" kern="1200" cap="none" spc="0" normalizeH="0" baseline="0" noProof="0" dirty="0">
+                <a:ln>
+                  <a:noFill/>
+                </a:ln>
+                <a:solidFill>
+                  <a:prstClr val="white"/>
+                </a:solidFill>
+                <a:effectLst/>
+                <a:uLnTx/>
+                <a:uFillTx/>
+                <a:latin typeface="Montserrat"/>
+                <a:ea typeface="+mn-ea"/>
+                <a:cs typeface="+mn-cs"/>
+              </a:rPr>
+              <a:t>Useability</a:t>
+            </a:r>
+          </a:p>
+          <a:p>
+            <a:pPr marL="742950" marR="0" lvl="1" indent="-285750" algn="l" defTabSz="914400" rtl="0" eaLnBrk="1" fontAlgn="auto" latinLnBrk="0" hangingPunct="1">
+              <a:lnSpc>
+                <a:spcPct val="100000"/>
+              </a:lnSpc>
+              <a:spcBef>
+                <a:spcPts val="0"/>
+              </a:spcBef>
+              <a:spcAft>
+                <a:spcPts val="0"/>
+              </a:spcAft>
+              <a:buClrTx/>
+              <a:buSzTx/>
+              <a:buFont typeface="Arial" panose="020B0604020202020204" pitchFamily="34" charset="0"/>
+              <a:buChar char="•"/>
+              <a:tabLst/>
+              <a:defRPr/>
+            </a:pPr>
+            <a:r>
+              <a:rPr kumimoji="0" lang="en-ZA" sz="1800" b="0" i="0" u="none" strike="noStrike" kern="1200" cap="none" spc="0" normalizeH="0" baseline="0" noProof="0" dirty="0">
+                <a:ln>
+                  <a:noFill/>
+                </a:ln>
+                <a:solidFill>
+                  <a:prstClr val="white"/>
+                </a:solidFill>
+                <a:effectLst/>
+                <a:uLnTx/>
+                <a:uFillTx/>
+                <a:latin typeface="Montserrat"/>
+                <a:ea typeface="+mn-ea"/>
+                <a:cs typeface="+mn-cs"/>
+              </a:rPr>
+              <a:t>Feedback from </a:t>
+            </a:r>
+            <a:r>
+              <a:rPr lang="en-ZA" dirty="0">
+                <a:solidFill>
+                  <a:prstClr val="white"/>
+                </a:solidFill>
+                <a:latin typeface="Montserrat"/>
+              </a:rPr>
+              <a:t>Clients</a:t>
+            </a:r>
+            <a:endParaRPr kumimoji="0" lang="en-ZA" sz="1800" b="0" i="0" u="none" strike="noStrike" kern="1200" cap="none" spc="0" normalizeH="0" baseline="0" noProof="0" dirty="0">
+              <a:ln>
+                <a:noFill/>
+              </a:ln>
+              <a:solidFill>
+                <a:prstClr val="white"/>
+              </a:solidFill>
+              <a:effectLst/>
+              <a:uLnTx/>
+              <a:uFillTx/>
+              <a:latin typeface="Montserrat"/>
+              <a:ea typeface="+mn-ea"/>
+              <a:cs typeface="+mn-cs"/>
+            </a:endParaRPr>
+          </a:p>
+          <a:p>
+            <a:pPr marL="742950" marR="0" lvl="1" indent="-285750" algn="l" defTabSz="914400" rtl="0" eaLnBrk="1" fontAlgn="auto" latinLnBrk="0" hangingPunct="1">
+              <a:lnSpc>
+                <a:spcPct val="100000"/>
+              </a:lnSpc>
+              <a:spcBef>
+                <a:spcPts val="0"/>
+              </a:spcBef>
+              <a:spcAft>
+                <a:spcPts val="0"/>
+              </a:spcAft>
+              <a:buClrTx/>
+              <a:buSzTx/>
+              <a:buFont typeface="Arial" panose="020B0604020202020204" pitchFamily="34" charset="0"/>
+              <a:buChar char="•"/>
+              <a:tabLst/>
+              <a:defRPr/>
+            </a:pPr>
+            <a:r>
+              <a:rPr kumimoji="0" lang="en-ZA" sz="1800" b="0" i="0" u="none" strike="noStrike" kern="1200" cap="none" spc="0" normalizeH="0" baseline="0" noProof="0" dirty="0">
+                <a:ln>
+                  <a:noFill/>
+                </a:ln>
+                <a:solidFill>
+                  <a:prstClr val="white"/>
+                </a:solidFill>
+                <a:effectLst/>
+                <a:uLnTx/>
+                <a:uFillTx/>
+                <a:latin typeface="Montserrat"/>
+                <a:ea typeface="+mn-ea"/>
+                <a:cs typeface="+mn-cs"/>
+              </a:rPr>
+              <a:t>Feedback from useability tests carried out on peers</a:t>
+            </a:r>
+          </a:p>
+          <a:p>
+            <a:pPr marR="0" lvl="0" algn="l" defTabSz="914400" rtl="0" eaLnBrk="1" fontAlgn="auto" latinLnBrk="0" hangingPunct="1">
+              <a:lnSpc>
+                <a:spcPct val="100000"/>
+              </a:lnSpc>
+              <a:spcBef>
+                <a:spcPts val="0"/>
+              </a:spcBef>
+              <a:spcAft>
+                <a:spcPts val="0"/>
+              </a:spcAft>
+              <a:buClrTx/>
+              <a:buSzTx/>
+              <a:tabLst/>
+              <a:defRPr/>
+            </a:pPr>
+            <a:endParaRPr kumimoji="0" lang="en-ZA" sz="1800" b="0" i="0" u="none" strike="noStrike" kern="1200" cap="none" spc="0" normalizeH="0" baseline="0" noProof="0" dirty="0">
+              <a:ln>
+                <a:noFill/>
+              </a:ln>
+              <a:solidFill>
+                <a:prstClr val="white"/>
+              </a:solidFill>
+              <a:effectLst/>
+              <a:uLnTx/>
+              <a:uFillTx/>
+              <a:latin typeface="Montserrat"/>
+              <a:ea typeface="+mn-ea"/>
+              <a:cs typeface="+mn-cs"/>
+            </a:endParaRPr>
+          </a:p>
+        </p:txBody>
+      </p:sp>
+    </p:spTree>
+    <p:extLst>
+      <p:ext uri="{BB962C8B-B14F-4D97-AF65-F5344CB8AC3E}">
+        <p14:creationId xmlns:p14="http://schemas.microsoft.com/office/powerpoint/2010/main" val="2132177623"/>
+      </p:ext>
+    </p:extLst>
+  </p:cSld>
+  <p:clrMapOvr>
+    <a:masterClrMapping/>
+  </p:clrMapOvr>
+</p:sld>
+</file>
+
+<file path=ppt/slides/slide12.xml><?xml version="1.0" encoding="utf-8"?>
+<p:sld xmlns:a="http://schemas.openxmlformats.org/drawingml/2006/main" xmlns:r="http://schemas.openxmlformats.org/officeDocument/2006/relationships" xmlns:p="http://schemas.openxmlformats.org/presentationml/2006/main">
+  <p:cSld>
+    <p:bg>
+      <p:bgPr>
+        <a:solidFill>
+          <a:srgbClr val="DE283B"/>
+        </a:solidFill>
+        <a:effectLst/>
+      </p:bgPr>
+    </p:bg>
+    <p:spTree>
+      <p:nvGrpSpPr>
+        <p:cNvPr id="1" name=""/>
+        <p:cNvGrpSpPr/>
+        <p:nvPr/>
+      </p:nvGrpSpPr>
+      <p:grpSpPr>
+        <a:xfrm>
+          <a:off x="0" y="0"/>
+          <a:ext cx="0" cy="0"/>
+          <a:chOff x="0" y="0"/>
+          <a:chExt cx="0" cy="0"/>
+        </a:xfrm>
+      </p:grpSpPr>
+      <p:sp>
+        <p:nvSpPr>
           <p:cNvPr id="5" name="Oval 4">
             <a:extLst>
               <a:ext uri="{FF2B5EF4-FFF2-40B4-BE49-F238E27FC236}">
@@ -6336,7 +9537,7 @@
 </p:sld>
 </file>
 
-<file path=ppt/slides/slide11.xml><?xml version="1.0" encoding="utf-8"?>
+<file path=ppt/slides/slide13.xml><?xml version="1.0" encoding="utf-8"?>
 <p:sld xmlns:a="http://schemas.openxmlformats.org/drawingml/2006/main" xmlns:r="http://schemas.openxmlformats.org/officeDocument/2006/relationships" xmlns:p="http://schemas.openxmlformats.org/presentationml/2006/main">
   <p:cSld>
     <p:bg>
@@ -7687,7 +10888,7 @@
 </p:sld>
 </file>
 
-<file path=ppt/slides/slide12.xml><?xml version="1.0" encoding="utf-8"?>
+<file path=ppt/slides/slide14.xml><?xml version="1.0" encoding="utf-8"?>
 <p:sld xmlns:a="http://schemas.openxmlformats.org/drawingml/2006/main" xmlns:r="http://schemas.openxmlformats.org/officeDocument/2006/relationships" xmlns:p="http://schemas.openxmlformats.org/presentationml/2006/main">
   <p:cSld>
     <p:bg>
@@ -8525,7 +11726,7 @@
         <p:spPr>
           <a:xfrm>
             <a:off x="1379220" y="1444692"/>
-            <a:ext cx="9569805" cy="830997"/>
+            <a:ext cx="9569805" cy="338554"/>
           </a:xfrm>
           <a:prstGeom prst="rect">
             <a:avLst/>
@@ -8561,19 +11762,6 @@
               <a:t> :</a:t>
             </a:r>
           </a:p>
-          <a:p>
-            <a:r>
-              <a:rPr lang="en-US" sz="1600" dirty="0">
-                <a:solidFill>
-                  <a:schemeClr val="bg1">
-                    <a:lumMod val="95000"/>
-                  </a:schemeClr>
-                </a:solidFill>
-                <a:latin typeface="Montserrat" panose="00000500000000000000" pitchFamily="2" charset="0"/>
-              </a:rPr>
-              <a:t>https://docs.google.com/document/d/1FNxalkJyS_z4un1vbU_tbjhc11ChwGCFZWnFwxdHtWs/edit?usp=sharing</a:t>
-            </a:r>
-          </a:p>
         </p:txBody>
       </p:sp>
       <p:sp>
@@ -8646,7 +11834,7 @@
         <p:spPr>
           <a:xfrm>
             <a:off x="1393921" y="2260534"/>
-            <a:ext cx="8528916" cy="830997"/>
+            <a:ext cx="8528916" cy="338554"/>
           </a:xfrm>
           <a:prstGeom prst="rect">
             <a:avLst/>
@@ -8682,19 +11870,6 @@
               <a:t>:</a:t>
             </a:r>
           </a:p>
-          <a:p>
-            <a:r>
-              <a:rPr lang="en-US" sz="1600" dirty="0">
-                <a:solidFill>
-                  <a:schemeClr val="bg1">
-                    <a:lumMod val="95000"/>
-                  </a:schemeClr>
-                </a:solidFill>
-                <a:latin typeface="Montserrat" panose="00000500000000000000" pitchFamily="2" charset="0"/>
-              </a:rPr>
-              <a:t>https://docs.google.com/document/d/1O9nSyRc4AnpJR6OemmWQ-xqq8WpFlOEMMwof24FtcZM/edit?usp=sharing</a:t>
-            </a:r>
-          </a:p>
         </p:txBody>
       </p:sp>
       <p:sp>
@@ -8712,7 +11887,7 @@
         <p:spPr>
           <a:xfrm>
             <a:off x="1397482" y="3096313"/>
-            <a:ext cx="9701085" cy="830997"/>
+            <a:ext cx="9701085" cy="338554"/>
           </a:xfrm>
           <a:prstGeom prst="rect">
             <a:avLst/>
@@ -8748,19 +11923,6 @@
               <a:t>:</a:t>
             </a:r>
           </a:p>
-          <a:p>
-            <a:r>
-              <a:rPr lang="en-US" sz="1600" dirty="0">
-                <a:solidFill>
-                  <a:schemeClr val="bg1">
-                    <a:lumMod val="95000"/>
-                  </a:schemeClr>
-                </a:solidFill>
-                <a:latin typeface="Montserrat" panose="00000500000000000000" pitchFamily="2" charset="0"/>
-              </a:rPr>
-              <a:t>https://docs.google.com/document/d/1HCZ-ZI3okxzFpxuS3s0umlZHWfhlxg080Cy9BSRCgUw/edit?usp=sharing</a:t>
-            </a:r>
-          </a:p>
         </p:txBody>
       </p:sp>
       <p:sp>
@@ -8777,8 +11939,8 @@
         </p:nvSpPr>
         <p:spPr>
           <a:xfrm>
-            <a:off x="1413844" y="5015682"/>
-            <a:ext cx="8528916" cy="830997"/>
+            <a:off x="1413844" y="4913701"/>
+            <a:ext cx="8528916" cy="338554"/>
           </a:xfrm>
           <a:prstGeom prst="rect">
             <a:avLst/>
@@ -8814,19 +11976,6 @@
               <a:t>:</a:t>
             </a:r>
           </a:p>
-          <a:p>
-            <a:r>
-              <a:rPr lang="en-US" sz="1600" dirty="0">
-                <a:solidFill>
-                  <a:schemeClr val="bg1">
-                    <a:lumMod val="95000"/>
-                  </a:schemeClr>
-                </a:solidFill>
-                <a:latin typeface="Montserrat" panose="00000500000000000000" pitchFamily="2" charset="0"/>
-              </a:rPr>
-              <a:t>https://docs.google.com/document/d/1M98t9zF3-RE-5J3o0zxaH6WkYfvV2cTc-NFutRnboNE/edit?usp=sharing</a:t>
-            </a:r>
-          </a:p>
         </p:txBody>
       </p:sp>
       <p:sp>
@@ -8844,7 +11993,7 @@
         <p:spPr>
           <a:xfrm>
             <a:off x="1379220" y="5869314"/>
-            <a:ext cx="8528916" cy="830997"/>
+            <a:ext cx="8528916" cy="338554"/>
           </a:xfrm>
           <a:prstGeom prst="rect">
             <a:avLst/>
@@ -8878,19 +12027,6 @@
                 <a:latin typeface="Montserrat" panose="00000500000000000000" pitchFamily="2" charset="0"/>
               </a:rPr>
               <a:t>:</a:t>
-            </a:r>
-          </a:p>
-          <a:p>
-            <a:r>
-              <a:rPr lang="en-US" sz="1600" dirty="0">
-                <a:solidFill>
-                  <a:schemeClr val="bg1">
-                    <a:lumMod val="95000"/>
-                  </a:schemeClr>
-                </a:solidFill>
-                <a:latin typeface="Montserrat" panose="00000500000000000000" pitchFamily="2" charset="0"/>
-              </a:rPr>
-              <a:t>https://docs.google.com/document/d/1CRYnwFSLjK_rSGJzP4HW0iUqKhk1xZOkSWiUSG46h-8/edit?usp=sharing</a:t>
             </a:r>
           </a:p>
         </p:txBody>
@@ -16199,8 +19335,8 @@
         </p:nvSpPr>
         <p:spPr>
           <a:xfrm>
-            <a:off x="2476240" y="61969"/>
-            <a:ext cx="7239519" cy="584775"/>
+            <a:off x="8000434" y="335513"/>
+            <a:ext cx="4196935" cy="584775"/>
           </a:xfrm>
           <a:prstGeom prst="rect">
             <a:avLst/>
@@ -16249,8 +19385,8 @@
         </p:nvSpPr>
         <p:spPr>
           <a:xfrm>
-            <a:off x="8248084" y="2571001"/>
-            <a:ext cx="4196935" cy="2031325"/>
+            <a:off x="8320510" y="2410596"/>
+            <a:ext cx="4196935" cy="2062103"/>
           </a:xfrm>
           <a:prstGeom prst="rect">
             <a:avLst/>
@@ -16264,7 +19400,7 @@
           <a:lstStyle/>
           <a:p>
             <a:r>
-              <a:rPr lang="en-ZA" dirty="0">
+              <a:rPr lang="en-ZA" sz="2000" dirty="0">
                 <a:solidFill>
                   <a:schemeClr val="bg1"/>
                 </a:solidFill>
@@ -16355,10 +19491,10 @@
       </p:sp>
       <p:pic>
         <p:nvPicPr>
-          <p:cNvPr id="12" name="Picture 11" descr="A diagram of a company&#10;&#10;Description automatically generated">
-            <a:extLst>
-              <a:ext uri="{FF2B5EF4-FFF2-40B4-BE49-F238E27FC236}">
-                <a16:creationId xmlns:a16="http://schemas.microsoft.com/office/drawing/2014/main" id="{58021D2F-AB2D-5F15-ACD6-FEE1E11D6A32}"/>
+          <p:cNvPr id="6" name="Picture 5" descr="A diagram of a computer system&#10;&#10;Description automatically generated with medium confidence">
+            <a:extLst>
+              <a:ext uri="{FF2B5EF4-FFF2-40B4-BE49-F238E27FC236}">
+                <a16:creationId xmlns:a16="http://schemas.microsoft.com/office/drawing/2014/main" id="{90FC5FC3-8EF7-16AC-6953-0B20F2BA4A84}"/>
               </a:ext>
             </a:extLst>
           </p:cNvPr>
@@ -16381,20 +19517,23 @@
         </p:blipFill>
         <p:spPr>
           <a:xfrm>
-            <a:off x="295581" y="4439792"/>
-            <a:ext cx="7704853" cy="2367515"/>
+            <a:off x="363675" y="57448"/>
+            <a:ext cx="7527113" cy="3724743"/>
           </a:xfrm>
           <a:prstGeom prst="rect">
             <a:avLst/>
           </a:prstGeom>
+          <a:ln>
+            <a:noFill/>
+          </a:ln>
         </p:spPr>
       </p:pic>
       <p:pic>
         <p:nvPicPr>
-          <p:cNvPr id="6" name="Picture 5" descr="A diagram of a computer system&#10;&#10;Description automatically generated with medium confidence">
-            <a:extLst>
-              <a:ext uri="{FF2B5EF4-FFF2-40B4-BE49-F238E27FC236}">
-                <a16:creationId xmlns:a16="http://schemas.microsoft.com/office/drawing/2014/main" id="{90FC5FC3-8EF7-16AC-6953-0B20F2BA4A84}"/>
+          <p:cNvPr id="4" name="Picture 3" descr="A computer screen shot of a diagram&#10;&#10;Description automatically generated">
+            <a:extLst>
+              <a:ext uri="{FF2B5EF4-FFF2-40B4-BE49-F238E27FC236}">
+                <a16:creationId xmlns:a16="http://schemas.microsoft.com/office/drawing/2014/main" id="{C6B7AB75-C10B-BBCB-4235-A74E99C363A3}"/>
               </a:ext>
             </a:extLst>
           </p:cNvPr>
@@ -16417,8 +19556,8 @@
         </p:blipFill>
         <p:spPr>
           <a:xfrm>
-            <a:off x="295581" y="605743"/>
-            <a:ext cx="7704000" cy="3812274"/>
+            <a:off x="1193687" y="3894234"/>
+            <a:ext cx="5500460" cy="2906318"/>
           </a:xfrm>
           <a:prstGeom prst="rect">
             <a:avLst/>
@@ -16441,8 +19580,8 @@
         </p:nvCxnSpPr>
         <p:spPr>
           <a:xfrm>
-            <a:off x="5395913" y="3718560"/>
-            <a:ext cx="0" cy="884029"/>
+            <a:off x="5531822" y="3158490"/>
+            <a:ext cx="0" cy="1184910"/>
           </a:xfrm>
           <a:prstGeom prst="straightConnector1">
             <a:avLst/>
@@ -16469,6 +19608,116 @@
           </a:fontRef>
         </p:style>
       </p:cxnSp>
+      <p:sp>
+        <p:nvSpPr>
+          <p:cNvPr id="9" name="Oval 8">
+            <a:extLst>
+              <a:ext uri="{FF2B5EF4-FFF2-40B4-BE49-F238E27FC236}">
+                <a16:creationId xmlns:a16="http://schemas.microsoft.com/office/drawing/2014/main" id="{9A3877EE-3A3F-A9DA-C007-DFC83C4FE4FD}"/>
+              </a:ext>
+            </a:extLst>
+          </p:cNvPr>
+          <p:cNvSpPr/>
+          <p:nvPr/>
+        </p:nvSpPr>
+        <p:spPr>
+          <a:xfrm>
+            <a:off x="8320510" y="5151794"/>
+            <a:ext cx="262560" cy="262560"/>
+          </a:xfrm>
+          <a:prstGeom prst="ellipse">
+            <a:avLst/>
+          </a:prstGeom>
+          <a:solidFill>
+            <a:schemeClr val="bg1"/>
+          </a:solidFill>
+          <a:ln>
+            <a:noFill/>
+          </a:ln>
+        </p:spPr>
+        <p:style>
+          <a:lnRef idx="2">
+            <a:schemeClr val="accent1">
+              <a:shade val="50000"/>
+            </a:schemeClr>
+          </a:lnRef>
+          <a:fillRef idx="1">
+            <a:schemeClr val="accent1"/>
+          </a:fillRef>
+          <a:effectRef idx="0">
+            <a:schemeClr val="accent1"/>
+          </a:effectRef>
+          <a:fontRef idx="minor">
+            <a:schemeClr val="lt1"/>
+          </a:fontRef>
+        </p:style>
+        <p:txBody>
+          <a:bodyPr rtlCol="0" anchor="ctr"/>
+          <a:lstStyle/>
+          <a:p>
+            <a:pPr algn="ctr"/>
+            <a:endParaRPr lang="en-US" dirty="0">
+              <a:latin typeface="+mj-lt"/>
+            </a:endParaRPr>
+          </a:p>
+        </p:txBody>
+      </p:sp>
+      <p:sp>
+        <p:nvSpPr>
+          <p:cNvPr id="14" name="Oval 13">
+            <a:extLst>
+              <a:ext uri="{FF2B5EF4-FFF2-40B4-BE49-F238E27FC236}">
+                <a16:creationId xmlns:a16="http://schemas.microsoft.com/office/drawing/2014/main" id="{E2E579AF-5246-AFD5-B460-FA414C38FA39}"/>
+              </a:ext>
+            </a:extLst>
+          </p:cNvPr>
+          <p:cNvSpPr/>
+          <p:nvPr/>
+        </p:nvSpPr>
+        <p:spPr>
+          <a:xfrm>
+            <a:off x="9373101" y="1410323"/>
+            <a:ext cx="265421" cy="222534"/>
+          </a:xfrm>
+          <a:prstGeom prst="ellipse">
+            <a:avLst/>
+          </a:prstGeom>
+          <a:solidFill>
+            <a:schemeClr val="bg2">
+              <a:lumMod val="25000"/>
+            </a:schemeClr>
+          </a:solidFill>
+          <a:ln>
+            <a:noFill/>
+          </a:ln>
+        </p:spPr>
+        <p:style>
+          <a:lnRef idx="2">
+            <a:schemeClr val="accent1">
+              <a:shade val="50000"/>
+            </a:schemeClr>
+          </a:lnRef>
+          <a:fillRef idx="1">
+            <a:schemeClr val="accent1"/>
+          </a:fillRef>
+          <a:effectRef idx="0">
+            <a:schemeClr val="accent1"/>
+          </a:effectRef>
+          <a:fontRef idx="minor">
+            <a:schemeClr val="lt1"/>
+          </a:fontRef>
+        </p:style>
+        <p:txBody>
+          <a:bodyPr rtlCol="0" anchor="ctr"/>
+          <a:lstStyle/>
+          <a:p>
+            <a:pPr algn="ctr"/>
+            <a:endParaRPr lang="en-US" dirty="0">
+              <a:latin typeface="+mj-lt"/>
+            </a:endParaRPr>
+          </a:p>
+        </p:txBody>
+      </p:sp>
     </p:spTree>
     <p:extLst>
       <p:ext uri="{BB962C8B-B14F-4D97-AF65-F5344CB8AC3E}">
@@ -17785,7 +21034,7 @@
         </p:nvSpPr>
         <p:spPr>
           <a:xfrm>
-            <a:off x="1607687" y="1773236"/>
+            <a:off x="1751408" y="1670162"/>
             <a:ext cx="9730549" cy="3970318"/>
           </a:xfrm>
           <a:prstGeom prst="rect">
@@ -20528,7 +23777,7 @@
         </p:nvSpPr>
         <p:spPr>
           <a:xfrm>
-            <a:off x="2164044" y="131279"/>
+            <a:off x="2164044" y="355"/>
             <a:ext cx="8126062" cy="830997"/>
           </a:xfrm>
           <a:prstGeom prst="rect">
@@ -20720,6 +23969,42 @@
           </a:prstGeom>
         </p:spPr>
       </p:pic>
+      <p:pic>
+        <p:nvPicPr>
+          <p:cNvPr id="17" name="Picture 16" descr="A screenshot of a computer diagram&#10;&#10;Description automatically generated">
+            <a:extLst>
+              <a:ext uri="{FF2B5EF4-FFF2-40B4-BE49-F238E27FC236}">
+                <a16:creationId xmlns:a16="http://schemas.microsoft.com/office/drawing/2014/main" id="{08404BB3-34F0-7EA1-2D5B-417FC90BAB67}"/>
+              </a:ext>
+            </a:extLst>
+          </p:cNvPr>
+          <p:cNvPicPr>
+            <a:picLocks noChangeAspect="1"/>
+          </p:cNvPicPr>
+          <p:nvPr/>
+        </p:nvPicPr>
+        <p:blipFill>
+          <a:blip r:embed="rId4">
+            <a:extLst>
+              <a:ext uri="{28A0092B-C50C-407E-A947-70E740481C1C}">
+                <a14:useLocalDpi xmlns:a14="http://schemas.microsoft.com/office/drawing/2010/main" val="0"/>
+              </a:ext>
+            </a:extLst>
+          </a:blip>
+          <a:stretch>
+            <a:fillRect/>
+          </a:stretch>
+        </p:blipFill>
+        <p:spPr>
+          <a:xfrm>
+            <a:off x="3258225" y="877563"/>
+            <a:ext cx="5381922" cy="5788187"/>
+          </a:xfrm>
+          <a:prstGeom prst="rect">
+            <a:avLst/>
+          </a:prstGeom>
+        </p:spPr>
+      </p:pic>
     </p:spTree>
     <p:extLst>
       <p:ext uri="{BB962C8B-B14F-4D97-AF65-F5344CB8AC3E}">
@@ -21964,7 +25249,7 @@
         <p:spPr>
           <a:xfrm>
             <a:off x="2164044" y="1131102"/>
-            <a:ext cx="6702476" cy="923330"/>
+            <a:ext cx="7040710" cy="923330"/>
           </a:xfrm>
           <a:prstGeom prst="rect">
             <a:avLst/>
@@ -21996,13 +25281,20 @@
               <a:buChar char="•"/>
             </a:pPr>
             <a:r>
-              <a:rPr lang="en-ZA" dirty="0">
+              <a:rPr lang="en-GB" sz="1800" b="0" i="0" u="none" strike="noStrike" dirty="0">
                 <a:solidFill>
                   <a:schemeClr val="bg1"/>
                 </a:solidFill>
+                <a:effectLst/>
+                <a:latin typeface="Arial" panose="020B0604020202020204" pitchFamily="34" charset="0"/>
               </a:rPr>
-              <a:t>Say something about performance</a:t>
+              <a:t>Used lighthouse performance testing from google</a:t>
             </a:r>
+            <a:endParaRPr lang="en-ZA" dirty="0">
+              <a:solidFill>
+                <a:schemeClr val="bg1"/>
+              </a:solidFill>
+            </a:endParaRPr>
           </a:p>
           <a:p>
             <a:pPr marL="742950" lvl="1" indent="-285750">
@@ -22015,7 +25307,7 @@
                   <a:schemeClr val="bg1"/>
                 </a:solidFill>
               </a:rPr>
-              <a:t>Uptime measured using uptime robot, over 99.9%</a:t>
+              <a:t>Uptime measured using uptime robot, well over 99%</a:t>
             </a:r>
           </a:p>
         </p:txBody>
@@ -22047,8 +25339,8 @@
         </p:blipFill>
         <p:spPr bwMode="auto">
           <a:xfrm>
-            <a:off x="130410" y="2465120"/>
-            <a:ext cx="7460920" cy="3400856"/>
+            <a:off x="1925403" y="2439153"/>
+            <a:ext cx="8485034" cy="3867670"/>
           </a:xfrm>
           <a:prstGeom prst="rect">
             <a:avLst/>
@@ -23182,7 +26474,7 @@
         </p:nvSpPr>
         <p:spPr>
           <a:xfrm>
-            <a:off x="2164044" y="131279"/>
+            <a:off x="2164044" y="218746"/>
             <a:ext cx="8126062" cy="830997"/>
           </a:xfrm>
           <a:prstGeom prst="rect">
@@ -23217,9 +26509,9 @@
               <a:rPr kumimoji="0" lang="en-US" sz="4800" b="1" i="0" u="none" strike="noStrike" kern="1200" cap="none" spc="0" normalizeH="0" baseline="0" noProof="0" dirty="0">
                 <a:ln>
                   <a:solidFill>
-                    <a:schemeClr val="bg2">
+                    <a:srgbClr val="E7E6E6">
                       <a:lumMod val="50000"/>
-                    </a:schemeClr>
+                    </a:srgbClr>
                   </a:solidFill>
                 </a:ln>
                 <a:solidFill>
@@ -23313,8 +26605,8 @@
         </p:nvSpPr>
         <p:spPr>
           <a:xfrm>
-            <a:off x="2164044" y="1428807"/>
-            <a:ext cx="7040710" cy="4247317"/>
+            <a:off x="2164044" y="1131102"/>
+            <a:ext cx="7040710" cy="923330"/>
           </a:xfrm>
           <a:prstGeom prst="rect">
             <a:avLst/>
@@ -23359,7 +26651,36 @@
                 <a:ea typeface="+mn-ea"/>
                 <a:cs typeface="+mn-cs"/>
               </a:rPr>
-              <a:t>Security</a:t>
+              <a:t>Performance and Availability</a:t>
+            </a:r>
+          </a:p>
+          <a:p>
+            <a:pPr marL="742950" marR="0" lvl="1" indent="-285750" algn="l" defTabSz="914400" rtl="0" eaLnBrk="1" fontAlgn="auto" latinLnBrk="0" hangingPunct="1">
+              <a:lnSpc>
+                <a:spcPct val="100000"/>
+              </a:lnSpc>
+              <a:spcBef>
+                <a:spcPts val="0"/>
+              </a:spcBef>
+              <a:spcAft>
+                <a:spcPts val="0"/>
+              </a:spcAft>
+              <a:buClrTx/>
+              <a:buSzTx/>
+              <a:buFont typeface="Arial" panose="020B0604020202020204" pitchFamily="34" charset="0"/>
+              <a:buChar char="•"/>
+              <a:tabLst/>
+              <a:defRPr/>
+            </a:pPr>
+            <a:r>
+              <a:rPr lang="en-GB" sz="1800" b="0" i="0" u="none" strike="noStrike" dirty="0">
+                <a:solidFill>
+                  <a:schemeClr val="bg1"/>
+                </a:solidFill>
+                <a:effectLst/>
+                <a:latin typeface="Arial" panose="020B0604020202020204" pitchFamily="34" charset="0"/>
+              </a:rPr>
+              <a:t>Used lighthouse performance testing from google</a:t>
             </a:r>
           </a:p>
           <a:p>
@@ -23395,544 +26716,86 @@
                 <a:ea typeface="+mn-ea"/>
                 <a:cs typeface="+mn-cs"/>
               </a:rPr>
-              <a:t>Encryption in transit (HTTPS) and at rest</a:t>
+              <a:t>Uptime measured using uptime robot, well over 99%</a:t>
             </a:r>
-          </a:p>
-          <a:p>
-            <a:pPr marL="742950" marR="0" lvl="1" indent="-285750" algn="l" defTabSz="914400" rtl="0" eaLnBrk="1" fontAlgn="auto" latinLnBrk="0" hangingPunct="1">
-              <a:lnSpc>
-                <a:spcPct val="100000"/>
-              </a:lnSpc>
-              <a:spcBef>
-                <a:spcPts val="0"/>
-              </a:spcBef>
-              <a:spcAft>
-                <a:spcPts val="0"/>
-              </a:spcAft>
-              <a:buClrTx/>
-              <a:buSzTx/>
-              <a:buFont typeface="Arial" panose="020B0604020202020204" pitchFamily="34" charset="0"/>
-              <a:buChar char="•"/>
-              <a:tabLst/>
-              <a:defRPr/>
-            </a:pPr>
-            <a:r>
-              <a:rPr kumimoji="0" lang="en-ZA" sz="1800" b="0" i="0" u="none" strike="noStrike" kern="1200" cap="none" spc="0" normalizeH="0" baseline="0" noProof="0" dirty="0">
-                <a:ln>
-                  <a:noFill/>
-                </a:ln>
-                <a:solidFill>
-                  <a:prstClr val="white"/>
-                </a:solidFill>
-                <a:effectLst/>
-                <a:uLnTx/>
-                <a:uFillTx/>
-                <a:latin typeface="Montserrat"/>
-                <a:ea typeface="+mn-ea"/>
-                <a:cs typeface="+mn-cs"/>
-              </a:rPr>
-              <a:t>Role Based Access with protected routes</a:t>
-            </a:r>
-          </a:p>
-          <a:p>
-            <a:pPr marL="742950" marR="0" lvl="1" indent="-285750" algn="l" defTabSz="914400" rtl="0" eaLnBrk="1" fontAlgn="auto" latinLnBrk="0" hangingPunct="1">
-              <a:lnSpc>
-                <a:spcPct val="100000"/>
-              </a:lnSpc>
-              <a:spcBef>
-                <a:spcPts val="0"/>
-              </a:spcBef>
-              <a:spcAft>
-                <a:spcPts val="0"/>
-              </a:spcAft>
-              <a:buClrTx/>
-              <a:buSzTx/>
-              <a:buFont typeface="Arial" panose="020B0604020202020204" pitchFamily="34" charset="0"/>
-              <a:buChar char="•"/>
-              <a:tabLst/>
-              <a:defRPr/>
-            </a:pPr>
-            <a:r>
-              <a:rPr lang="en-ZA" dirty="0">
-                <a:solidFill>
-                  <a:prstClr val="white"/>
-                </a:solidFill>
-                <a:latin typeface="Montserrat"/>
-              </a:rPr>
-              <a:t>Injection and XSS prevention</a:t>
-            </a:r>
-            <a:endParaRPr kumimoji="0" lang="en-ZA" sz="1800" b="0" i="0" u="none" strike="noStrike" kern="1200" cap="none" spc="0" normalizeH="0" baseline="0" noProof="0" dirty="0">
-              <a:ln>
-                <a:noFill/>
-              </a:ln>
-              <a:solidFill>
-                <a:prstClr val="white"/>
-              </a:solidFill>
-              <a:effectLst/>
-              <a:uLnTx/>
-              <a:uFillTx/>
-              <a:latin typeface="Montserrat"/>
-              <a:ea typeface="+mn-ea"/>
-              <a:cs typeface="+mn-cs"/>
-            </a:endParaRPr>
-          </a:p>
-          <a:p>
-            <a:pPr marL="742950" marR="0" lvl="1" indent="-285750" algn="l" defTabSz="914400" rtl="0" eaLnBrk="1" fontAlgn="auto" latinLnBrk="0" hangingPunct="1">
-              <a:lnSpc>
-                <a:spcPct val="100000"/>
-              </a:lnSpc>
-              <a:spcBef>
-                <a:spcPts val="0"/>
-              </a:spcBef>
-              <a:spcAft>
-                <a:spcPts val="0"/>
-              </a:spcAft>
-              <a:buClrTx/>
-              <a:buSzTx/>
-              <a:buFont typeface="Arial" panose="020B0604020202020204" pitchFamily="34" charset="0"/>
-              <a:buChar char="•"/>
-              <a:tabLst/>
-              <a:defRPr/>
-            </a:pPr>
-            <a:r>
-              <a:rPr kumimoji="0" lang="en-ZA" sz="1800" b="0" i="0" u="none" strike="noStrike" kern="1200" cap="none" spc="0" normalizeH="0" baseline="0" noProof="0" dirty="0">
-                <a:ln>
-                  <a:noFill/>
-                </a:ln>
-                <a:solidFill>
-                  <a:prstClr val="white"/>
-                </a:solidFill>
-                <a:effectLst/>
-                <a:uLnTx/>
-                <a:uFillTx/>
-                <a:latin typeface="Montserrat"/>
-                <a:ea typeface="+mn-ea"/>
-                <a:cs typeface="+mn-cs"/>
-              </a:rPr>
-              <a:t>JSON </a:t>
-            </a:r>
-            <a:r>
-              <a:rPr lang="en-ZA" dirty="0">
-                <a:solidFill>
-                  <a:prstClr val="white"/>
-                </a:solidFill>
-                <a:latin typeface="Montserrat"/>
-              </a:rPr>
-              <a:t>W</a:t>
-            </a:r>
-            <a:r>
-              <a:rPr kumimoji="0" lang="en-ZA" sz="1800" b="0" i="0" u="none" strike="noStrike" kern="1200" cap="none" spc="0" normalizeH="0" baseline="0" noProof="0" dirty="0" err="1">
-                <a:ln>
-                  <a:noFill/>
-                </a:ln>
-                <a:solidFill>
-                  <a:prstClr val="white"/>
-                </a:solidFill>
-                <a:effectLst/>
-                <a:uLnTx/>
-                <a:uFillTx/>
-                <a:latin typeface="Montserrat"/>
-                <a:ea typeface="+mn-ea"/>
-                <a:cs typeface="+mn-cs"/>
-              </a:rPr>
-              <a:t>eb</a:t>
-            </a:r>
-            <a:r>
-              <a:rPr kumimoji="0" lang="en-ZA" sz="1800" b="0" i="0" u="none" strike="noStrike" kern="1200" cap="none" spc="0" normalizeH="0" baseline="0" noProof="0" dirty="0">
-                <a:ln>
-                  <a:noFill/>
-                </a:ln>
-                <a:solidFill>
-                  <a:prstClr val="white"/>
-                </a:solidFill>
-                <a:effectLst/>
-                <a:uLnTx/>
-                <a:uFillTx/>
-                <a:latin typeface="Montserrat"/>
-                <a:ea typeface="+mn-ea"/>
-                <a:cs typeface="+mn-cs"/>
-              </a:rPr>
-              <a:t> Tokens </a:t>
-            </a:r>
-          </a:p>
-          <a:p>
-            <a:pPr marL="742950" marR="0" lvl="1" indent="-285750" algn="l" defTabSz="914400" rtl="0" eaLnBrk="1" fontAlgn="auto" latinLnBrk="0" hangingPunct="1">
-              <a:lnSpc>
-                <a:spcPct val="100000"/>
-              </a:lnSpc>
-              <a:spcBef>
-                <a:spcPts val="0"/>
-              </a:spcBef>
-              <a:spcAft>
-                <a:spcPts val="0"/>
-              </a:spcAft>
-              <a:buClrTx/>
-              <a:buSzTx/>
-              <a:buFont typeface="Arial" panose="020B0604020202020204" pitchFamily="34" charset="0"/>
-              <a:buChar char="•"/>
-              <a:tabLst/>
-              <a:defRPr/>
-            </a:pPr>
-            <a:endParaRPr kumimoji="0" lang="en-ZA" sz="1800" b="0" i="0" u="none" strike="noStrike" kern="1200" cap="none" spc="0" normalizeH="0" baseline="0" noProof="0" dirty="0">
-              <a:ln>
-                <a:noFill/>
-              </a:ln>
-              <a:solidFill>
-                <a:prstClr val="white"/>
-              </a:solidFill>
-              <a:effectLst/>
-              <a:uLnTx/>
-              <a:uFillTx/>
-              <a:latin typeface="Montserrat"/>
-              <a:ea typeface="+mn-ea"/>
-              <a:cs typeface="+mn-cs"/>
-            </a:endParaRPr>
-          </a:p>
-          <a:p>
-            <a:pPr marL="285750" marR="0" lvl="0" indent="-285750" algn="l" defTabSz="914400" rtl="0" eaLnBrk="1" fontAlgn="auto" latinLnBrk="0" hangingPunct="1">
-              <a:lnSpc>
-                <a:spcPct val="100000"/>
-              </a:lnSpc>
-              <a:spcBef>
-                <a:spcPts val="0"/>
-              </a:spcBef>
-              <a:spcAft>
-                <a:spcPts val="0"/>
-              </a:spcAft>
-              <a:buClrTx/>
-              <a:buSzTx/>
-              <a:buFont typeface="Wingdings" panose="05000000000000000000" pitchFamily="2" charset="2"/>
-              <a:buChar char="Ø"/>
-              <a:tabLst/>
-              <a:defRPr/>
-            </a:pPr>
-            <a:r>
-              <a:rPr kumimoji="0" lang="en-ZA" sz="1800" b="0" i="0" u="none" strike="noStrike" kern="1200" cap="none" spc="0" normalizeH="0" baseline="0" noProof="0" dirty="0">
-                <a:ln>
-                  <a:noFill/>
-                </a:ln>
-                <a:solidFill>
-                  <a:prstClr val="white"/>
-                </a:solidFill>
-                <a:effectLst/>
-                <a:uLnTx/>
-                <a:uFillTx/>
-                <a:latin typeface="Montserrat"/>
-                <a:ea typeface="+mn-ea"/>
-                <a:cs typeface="+mn-cs"/>
-              </a:rPr>
-              <a:t>Maintainability</a:t>
-            </a:r>
-          </a:p>
-          <a:p>
-            <a:pPr marL="742950" marR="0" lvl="1" indent="-285750" algn="l" defTabSz="914400" rtl="0" eaLnBrk="1" fontAlgn="auto" latinLnBrk="0" hangingPunct="1">
-              <a:lnSpc>
-                <a:spcPct val="100000"/>
-              </a:lnSpc>
-              <a:spcBef>
-                <a:spcPts val="0"/>
-              </a:spcBef>
-              <a:spcAft>
-                <a:spcPts val="0"/>
-              </a:spcAft>
-              <a:buClrTx/>
-              <a:buSzTx/>
-              <a:buFont typeface="Arial" panose="020B0604020202020204" pitchFamily="34" charset="0"/>
-              <a:buChar char="•"/>
-              <a:tabLst/>
-              <a:defRPr/>
-            </a:pPr>
-            <a:r>
-              <a:rPr kumimoji="0" lang="en-ZA" sz="1800" b="0" i="0" u="none" strike="noStrike" kern="1200" cap="none" spc="0" normalizeH="0" baseline="0" noProof="0" dirty="0">
-                <a:ln>
-                  <a:noFill/>
-                </a:ln>
-                <a:solidFill>
-                  <a:prstClr val="white"/>
-                </a:solidFill>
-                <a:effectLst/>
-                <a:uLnTx/>
-                <a:uFillTx/>
-                <a:latin typeface="Montserrat"/>
-                <a:ea typeface="+mn-ea"/>
-                <a:cs typeface="+mn-cs"/>
-              </a:rPr>
-              <a:t>Component based architecture</a:t>
-            </a:r>
-          </a:p>
-          <a:p>
-            <a:pPr marL="742950" marR="0" lvl="1" indent="-285750" algn="l" defTabSz="914400" rtl="0" eaLnBrk="1" fontAlgn="auto" latinLnBrk="0" hangingPunct="1">
-              <a:lnSpc>
-                <a:spcPct val="100000"/>
-              </a:lnSpc>
-              <a:spcBef>
-                <a:spcPts val="0"/>
-              </a:spcBef>
-              <a:spcAft>
-                <a:spcPts val="0"/>
-              </a:spcAft>
-              <a:buClrTx/>
-              <a:buSzTx/>
-              <a:buFont typeface="Arial" panose="020B0604020202020204" pitchFamily="34" charset="0"/>
-              <a:buChar char="•"/>
-              <a:tabLst/>
-              <a:defRPr/>
-            </a:pPr>
-            <a:r>
-              <a:rPr kumimoji="0" lang="en-ZA" sz="1800" b="0" i="0" u="none" strike="noStrike" kern="1200" cap="none" spc="0" normalizeH="0" baseline="0" noProof="0" dirty="0">
-                <a:ln>
-                  <a:noFill/>
-                </a:ln>
-                <a:solidFill>
-                  <a:prstClr val="white"/>
-                </a:solidFill>
-                <a:effectLst/>
-                <a:uLnTx/>
-                <a:uFillTx/>
-                <a:latin typeface="Montserrat"/>
-                <a:ea typeface="+mn-ea"/>
-                <a:cs typeface="+mn-cs"/>
-              </a:rPr>
-              <a:t>Thorough unit tests and code coverage </a:t>
-            </a:r>
-          </a:p>
-          <a:p>
-            <a:pPr marL="742950" marR="0" lvl="1" indent="-285750" algn="l" defTabSz="914400" rtl="0" eaLnBrk="1" fontAlgn="auto" latinLnBrk="0" hangingPunct="1">
-              <a:lnSpc>
-                <a:spcPct val="100000"/>
-              </a:lnSpc>
-              <a:spcBef>
-                <a:spcPts val="0"/>
-              </a:spcBef>
-              <a:spcAft>
-                <a:spcPts val="0"/>
-              </a:spcAft>
-              <a:buClrTx/>
-              <a:buSzTx/>
-              <a:buFont typeface="Arial" panose="020B0604020202020204" pitchFamily="34" charset="0"/>
-              <a:buChar char="•"/>
-              <a:tabLst/>
-              <a:defRPr/>
-            </a:pPr>
-            <a:r>
-              <a:rPr kumimoji="0" lang="en-ZA" sz="1800" b="0" i="0" u="none" strike="noStrike" kern="1200" cap="none" spc="0" normalizeH="0" baseline="0" noProof="0" dirty="0">
-                <a:ln>
-                  <a:noFill/>
-                </a:ln>
-                <a:solidFill>
-                  <a:prstClr val="white"/>
-                </a:solidFill>
-                <a:effectLst/>
-                <a:uLnTx/>
-                <a:uFillTx/>
-                <a:latin typeface="Montserrat"/>
-                <a:ea typeface="+mn-ea"/>
-                <a:cs typeface="+mn-cs"/>
-              </a:rPr>
-              <a:t>Uniform variable naming conventions</a:t>
-            </a:r>
-          </a:p>
-          <a:p>
-            <a:pPr marL="742950" marR="0" lvl="1" indent="-285750" algn="l" defTabSz="914400" rtl="0" eaLnBrk="1" fontAlgn="auto" latinLnBrk="0" hangingPunct="1">
-              <a:lnSpc>
-                <a:spcPct val="100000"/>
-              </a:lnSpc>
-              <a:spcBef>
-                <a:spcPts val="0"/>
-              </a:spcBef>
-              <a:spcAft>
-                <a:spcPts val="0"/>
-              </a:spcAft>
-              <a:buClrTx/>
-              <a:buSzTx/>
-              <a:buFont typeface="Arial" panose="020B0604020202020204" pitchFamily="34" charset="0"/>
-              <a:buChar char="•"/>
-              <a:tabLst/>
-              <a:defRPr/>
-            </a:pPr>
-            <a:endParaRPr kumimoji="0" lang="en-ZA" sz="1800" b="0" i="0" u="none" strike="noStrike" kern="1200" cap="none" spc="0" normalizeH="0" baseline="0" noProof="0" dirty="0">
-              <a:ln>
-                <a:noFill/>
-              </a:ln>
-              <a:solidFill>
-                <a:prstClr val="white"/>
-              </a:solidFill>
-              <a:effectLst/>
-              <a:uLnTx/>
-              <a:uFillTx/>
-              <a:latin typeface="Montserrat"/>
-              <a:ea typeface="+mn-ea"/>
-              <a:cs typeface="+mn-cs"/>
-            </a:endParaRPr>
-          </a:p>
-          <a:p>
-            <a:pPr marL="285750" marR="0" lvl="0" indent="-285750" algn="l" defTabSz="914400" rtl="0" eaLnBrk="1" fontAlgn="auto" latinLnBrk="0" hangingPunct="1">
-              <a:lnSpc>
-                <a:spcPct val="100000"/>
-              </a:lnSpc>
-              <a:spcBef>
-                <a:spcPts val="0"/>
-              </a:spcBef>
-              <a:spcAft>
-                <a:spcPts val="0"/>
-              </a:spcAft>
-              <a:buClrTx/>
-              <a:buSzTx/>
-              <a:buFont typeface="Wingdings" panose="05000000000000000000" pitchFamily="2" charset="2"/>
-              <a:buChar char="Ø"/>
-              <a:tabLst/>
-              <a:defRPr/>
-            </a:pPr>
-            <a:r>
-              <a:rPr kumimoji="0" lang="en-ZA" sz="1800" b="0" i="0" u="none" strike="noStrike" kern="1200" cap="none" spc="0" normalizeH="0" baseline="0" noProof="0" dirty="0">
-                <a:ln>
-                  <a:noFill/>
-                </a:ln>
-                <a:solidFill>
-                  <a:prstClr val="white"/>
-                </a:solidFill>
-                <a:effectLst/>
-                <a:uLnTx/>
-                <a:uFillTx/>
-                <a:latin typeface="Montserrat"/>
-                <a:ea typeface="+mn-ea"/>
-                <a:cs typeface="+mn-cs"/>
-              </a:rPr>
-              <a:t>Useability</a:t>
-            </a:r>
-          </a:p>
-          <a:p>
-            <a:pPr marL="742950" marR="0" lvl="1" indent="-285750" algn="l" defTabSz="914400" rtl="0" eaLnBrk="1" fontAlgn="auto" latinLnBrk="0" hangingPunct="1">
-              <a:lnSpc>
-                <a:spcPct val="100000"/>
-              </a:lnSpc>
-              <a:spcBef>
-                <a:spcPts val="0"/>
-              </a:spcBef>
-              <a:spcAft>
-                <a:spcPts val="0"/>
-              </a:spcAft>
-              <a:buClrTx/>
-              <a:buSzTx/>
-              <a:buFont typeface="Arial" panose="020B0604020202020204" pitchFamily="34" charset="0"/>
-              <a:buChar char="•"/>
-              <a:tabLst/>
-              <a:defRPr/>
-            </a:pPr>
-            <a:r>
-              <a:rPr kumimoji="0" lang="en-ZA" sz="1800" b="0" i="0" u="none" strike="noStrike" kern="1200" cap="none" spc="0" normalizeH="0" baseline="0" noProof="0" dirty="0">
-                <a:ln>
-                  <a:noFill/>
-                </a:ln>
-                <a:solidFill>
-                  <a:prstClr val="white"/>
-                </a:solidFill>
-                <a:effectLst/>
-                <a:uLnTx/>
-                <a:uFillTx/>
-                <a:latin typeface="Montserrat"/>
-                <a:ea typeface="+mn-ea"/>
-                <a:cs typeface="+mn-cs"/>
-              </a:rPr>
-              <a:t>Feedback from </a:t>
-            </a:r>
-            <a:r>
-              <a:rPr lang="en-ZA" dirty="0">
-                <a:solidFill>
-                  <a:prstClr val="white"/>
-                </a:solidFill>
-                <a:latin typeface="Montserrat"/>
-              </a:rPr>
-              <a:t>Clients</a:t>
-            </a:r>
-            <a:endParaRPr kumimoji="0" lang="en-ZA" sz="1800" b="0" i="0" u="none" strike="noStrike" kern="1200" cap="none" spc="0" normalizeH="0" baseline="0" noProof="0" dirty="0">
-              <a:ln>
-                <a:noFill/>
-              </a:ln>
-              <a:solidFill>
-                <a:prstClr val="white"/>
-              </a:solidFill>
-              <a:effectLst/>
-              <a:uLnTx/>
-              <a:uFillTx/>
-              <a:latin typeface="Montserrat"/>
-              <a:ea typeface="+mn-ea"/>
-              <a:cs typeface="+mn-cs"/>
-            </a:endParaRPr>
-          </a:p>
-          <a:p>
-            <a:pPr marL="742950" marR="0" lvl="1" indent="-285750" algn="l" defTabSz="914400" rtl="0" eaLnBrk="1" fontAlgn="auto" latinLnBrk="0" hangingPunct="1">
-              <a:lnSpc>
-                <a:spcPct val="100000"/>
-              </a:lnSpc>
-              <a:spcBef>
-                <a:spcPts val="0"/>
-              </a:spcBef>
-              <a:spcAft>
-                <a:spcPts val="0"/>
-              </a:spcAft>
-              <a:buClrTx/>
-              <a:buSzTx/>
-              <a:buFont typeface="Arial" panose="020B0604020202020204" pitchFamily="34" charset="0"/>
-              <a:buChar char="•"/>
-              <a:tabLst/>
-              <a:defRPr/>
-            </a:pPr>
-            <a:r>
-              <a:rPr kumimoji="0" lang="en-ZA" sz="1800" b="0" i="0" u="none" strike="noStrike" kern="1200" cap="none" spc="0" normalizeH="0" baseline="0" noProof="0" dirty="0">
-                <a:ln>
-                  <a:noFill/>
-                </a:ln>
-                <a:solidFill>
-                  <a:prstClr val="white"/>
-                </a:solidFill>
-                <a:effectLst/>
-                <a:uLnTx/>
-                <a:uFillTx/>
-                <a:latin typeface="Montserrat"/>
-                <a:ea typeface="+mn-ea"/>
-                <a:cs typeface="+mn-cs"/>
-              </a:rPr>
-              <a:t>Feedback from useability tests carried out on peers</a:t>
-            </a:r>
-          </a:p>
-          <a:p>
-            <a:pPr marR="0" lvl="0" algn="l" defTabSz="914400" rtl="0" eaLnBrk="1" fontAlgn="auto" latinLnBrk="0" hangingPunct="1">
-              <a:lnSpc>
-                <a:spcPct val="100000"/>
-              </a:lnSpc>
-              <a:spcBef>
-                <a:spcPts val="0"/>
-              </a:spcBef>
-              <a:spcAft>
-                <a:spcPts val="0"/>
-              </a:spcAft>
-              <a:buClrTx/>
-              <a:buSzTx/>
-              <a:tabLst/>
-              <a:defRPr/>
-            </a:pPr>
-            <a:endParaRPr kumimoji="0" lang="en-ZA" sz="1800" b="0" i="0" u="none" strike="noStrike" kern="1200" cap="none" spc="0" normalizeH="0" baseline="0" noProof="0" dirty="0">
-              <a:ln>
-                <a:noFill/>
-              </a:ln>
-              <a:solidFill>
-                <a:prstClr val="white"/>
-              </a:solidFill>
-              <a:effectLst/>
-              <a:uLnTx/>
-              <a:uFillTx/>
-              <a:latin typeface="Montserrat"/>
-              <a:ea typeface="+mn-ea"/>
-              <a:cs typeface="+mn-cs"/>
-            </a:endParaRPr>
           </a:p>
         </p:txBody>
       </p:sp>
+      <p:pic>
+        <p:nvPicPr>
+          <p:cNvPr id="3" name="Picture 2" descr="A screenshot of a computer&#10;&#10;Description automatically generated">
+            <a:extLst>
+              <a:ext uri="{FF2B5EF4-FFF2-40B4-BE49-F238E27FC236}">
+                <a16:creationId xmlns:a16="http://schemas.microsoft.com/office/drawing/2014/main" id="{01DD9BAA-7391-3D56-ECF2-FDAAE51E87BA}"/>
+              </a:ext>
+            </a:extLst>
+          </p:cNvPr>
+          <p:cNvPicPr>
+            <a:picLocks noChangeAspect="1"/>
+          </p:cNvPicPr>
+          <p:nvPr/>
+        </p:nvPicPr>
+        <p:blipFill rotWithShape="1">
+          <a:blip r:embed="rId4">
+            <a:extLst>
+              <a:ext uri="{28A0092B-C50C-407E-A947-70E740481C1C}">
+                <a14:useLocalDpi xmlns:a14="http://schemas.microsoft.com/office/drawing/2010/main" val="0"/>
+              </a:ext>
+            </a:extLst>
+          </a:blip>
+          <a:srcRect l="20761" r="21757"/>
+          <a:stretch/>
+        </p:blipFill>
+        <p:spPr>
+          <a:xfrm>
+            <a:off x="676734" y="2335070"/>
+            <a:ext cx="4581525" cy="3598686"/>
+          </a:xfrm>
+          <a:prstGeom prst="rect">
+            <a:avLst/>
+          </a:prstGeom>
+        </p:spPr>
+      </p:pic>
+      <p:pic>
+        <p:nvPicPr>
+          <p:cNvPr id="5" name="Picture 4" descr="A screenshot of a computer program&#10;&#10;Description automatically generated">
+            <a:extLst>
+              <a:ext uri="{FF2B5EF4-FFF2-40B4-BE49-F238E27FC236}">
+                <a16:creationId xmlns:a16="http://schemas.microsoft.com/office/drawing/2014/main" id="{7803ED3B-420F-8897-E883-4650E8E1BD9A}"/>
+              </a:ext>
+            </a:extLst>
+          </p:cNvPr>
+          <p:cNvPicPr>
+            <a:picLocks noChangeAspect="1"/>
+          </p:cNvPicPr>
+          <p:nvPr/>
+        </p:nvPicPr>
+        <p:blipFill>
+          <a:blip r:embed="rId5">
+            <a:extLst>
+              <a:ext uri="{28A0092B-C50C-407E-A947-70E740481C1C}">
+                <a14:useLocalDpi xmlns:a14="http://schemas.microsoft.com/office/drawing/2010/main" val="0"/>
+              </a:ext>
+            </a:extLst>
+          </a:blip>
+          <a:stretch>
+            <a:fillRect/>
+          </a:stretch>
+        </p:blipFill>
+        <p:spPr>
+          <a:xfrm>
+            <a:off x="5666206" y="2456342"/>
+            <a:ext cx="6006601" cy="3329156"/>
+          </a:xfrm>
+          <a:prstGeom prst="rect">
+            <a:avLst/>
+          </a:prstGeom>
+        </p:spPr>
+      </p:pic>
     </p:spTree>
     <p:extLst>
       <p:ext uri="{BB962C8B-B14F-4D97-AF65-F5344CB8AC3E}">
-        <p14:creationId xmlns:p14="http://schemas.microsoft.com/office/powerpoint/2010/main" val="2132177623"/>
+        <p14:creationId xmlns:p14="http://schemas.microsoft.com/office/powerpoint/2010/main" val="3175618895"/>
       </p:ext>
     </p:extLst>
   </p:cSld>

</xml_diff>